<commit_message>
selection su notebook diversi
</commit_message>
<xml_diff>
--- a/slide.pptx
+++ b/slide.pptx
@@ -5,16 +5,21 @@
     <p:sldMasterId id="2147483840" r:id="rId1"/>
   </p:sldMasterIdLst>
   <p:notesMasterIdLst>
-    <p:notesMasterId r:id="rId9"/>
+    <p:notesMasterId r:id="rId14"/>
   </p:notesMasterIdLst>
   <p:sldIdLst>
     <p:sldId id="256" r:id="rId2"/>
     <p:sldId id="257" r:id="rId3"/>
-    <p:sldId id="259" r:id="rId4"/>
-    <p:sldId id="260" r:id="rId5"/>
-    <p:sldId id="261" r:id="rId6"/>
-    <p:sldId id="262" r:id="rId7"/>
-    <p:sldId id="258" r:id="rId8"/>
+    <p:sldId id="267" r:id="rId4"/>
+    <p:sldId id="259" r:id="rId5"/>
+    <p:sldId id="260" r:id="rId6"/>
+    <p:sldId id="261" r:id="rId7"/>
+    <p:sldId id="264" r:id="rId8"/>
+    <p:sldId id="262" r:id="rId9"/>
+    <p:sldId id="266" r:id="rId10"/>
+    <p:sldId id="263" r:id="rId11"/>
+    <p:sldId id="265" r:id="rId12"/>
+    <p:sldId id="258" r:id="rId13"/>
   </p:sldIdLst>
   <p:sldSz cx="12192000" cy="6858000"/>
   <p:notesSz cx="6858000" cy="9144000"/>
@@ -207,7 +212,7 @@
           <a:p>
             <a:fld id="{8D28F922-D649-4874-97EB-5EE9CCD6D7D8}" type="datetimeFigureOut">
               <a:rPr lang="it-IT" smtClean="0"/>
-              <a:t>12/02/2019</a:t>
+              <a:t>15/02/2019</a:t>
             </a:fld>
             <a:endParaRPr lang="it-IT"/>
           </a:p>
@@ -699,7 +704,7 @@
             <a:fld id="{5586B75A-687E-405C-8A0B-8D00578BA2C3}" type="datetimeFigureOut">
               <a:rPr lang="en-US" dirty="0"/>
               <a:pPr/>
-              <a:t>2/12/2019</a:t>
+              <a:t>2/15/2019</a:t>
             </a:fld>
             <a:endParaRPr lang="en-US" dirty="0"/>
           </a:p>
@@ -866,7 +871,7 @@
             <a:fld id="{5586B75A-687E-405C-8A0B-8D00578BA2C3}" type="datetimeFigureOut">
               <a:rPr lang="en-US" dirty="0"/>
               <a:pPr/>
-              <a:t>2/12/2019</a:t>
+              <a:t>2/15/2019</a:t>
             </a:fld>
             <a:endParaRPr lang="en-US" dirty="0"/>
           </a:p>
@@ -1043,7 +1048,7 @@
             <a:fld id="{5586B75A-687E-405C-8A0B-8D00578BA2C3}" type="datetimeFigureOut">
               <a:rPr lang="en-US" dirty="0"/>
               <a:pPr/>
-              <a:t>2/12/2019</a:t>
+              <a:t>2/15/2019</a:t>
             </a:fld>
             <a:endParaRPr lang="en-US" dirty="0"/>
           </a:p>
@@ -1210,7 +1215,7 @@
             <a:fld id="{5586B75A-687E-405C-8A0B-8D00578BA2C3}" type="datetimeFigureOut">
               <a:rPr lang="en-US" dirty="0"/>
               <a:pPr/>
-              <a:t>2/12/2019</a:t>
+              <a:t>2/15/2019</a:t>
             </a:fld>
             <a:endParaRPr lang="en-US" dirty="0"/>
           </a:p>
@@ -1465,7 +1470,7 @@
             <a:fld id="{5586B75A-687E-405C-8A0B-8D00578BA2C3}" type="datetimeFigureOut">
               <a:rPr lang="en-US" dirty="0"/>
               <a:pPr/>
-              <a:t>2/12/2019</a:t>
+              <a:t>2/15/2019</a:t>
             </a:fld>
             <a:endParaRPr lang="en-US" dirty="0"/>
           </a:p>
@@ -1750,7 +1755,7 @@
             <a:fld id="{5586B75A-687E-405C-8A0B-8D00578BA2C3}" type="datetimeFigureOut">
               <a:rPr lang="en-US" dirty="0"/>
               <a:pPr/>
-              <a:t>2/12/2019</a:t>
+              <a:t>2/15/2019</a:t>
             </a:fld>
             <a:endParaRPr lang="en-US" dirty="0"/>
           </a:p>
@@ -2189,7 +2194,7 @@
             <a:fld id="{5586B75A-687E-405C-8A0B-8D00578BA2C3}" type="datetimeFigureOut">
               <a:rPr lang="en-US" dirty="0"/>
               <a:pPr/>
-              <a:t>2/12/2019</a:t>
+              <a:t>2/15/2019</a:t>
             </a:fld>
             <a:endParaRPr lang="en-US" dirty="0"/>
           </a:p>
@@ -2304,7 +2309,7 @@
             <a:fld id="{5586B75A-687E-405C-8A0B-8D00578BA2C3}" type="datetimeFigureOut">
               <a:rPr lang="en-US" dirty="0"/>
               <a:pPr/>
-              <a:t>2/12/2019</a:t>
+              <a:t>2/15/2019</a:t>
             </a:fld>
             <a:endParaRPr lang="en-US" dirty="0"/>
           </a:p>
@@ -2396,7 +2401,7 @@
             <a:fld id="{5586B75A-687E-405C-8A0B-8D00578BA2C3}" type="datetimeFigureOut">
               <a:rPr lang="en-US" dirty="0"/>
               <a:pPr/>
-              <a:t>2/12/2019</a:t>
+              <a:t>2/15/2019</a:t>
             </a:fld>
             <a:endParaRPr lang="en-US" dirty="0"/>
           </a:p>
@@ -2681,7 +2686,7 @@
             <a:fld id="{5586B75A-687E-405C-8A0B-8D00578BA2C3}" type="datetimeFigureOut">
               <a:rPr lang="en-US" dirty="0"/>
               <a:pPr/>
-              <a:t>2/12/2019</a:t>
+              <a:t>2/15/2019</a:t>
             </a:fld>
             <a:endParaRPr lang="en-US" dirty="0"/>
           </a:p>
@@ -2951,7 +2956,7 @@
             <a:fld id="{5586B75A-687E-405C-8A0B-8D00578BA2C3}" type="datetimeFigureOut">
               <a:rPr lang="en-US" dirty="0"/>
               <a:pPr/>
-              <a:t>2/12/2019</a:t>
+              <a:t>2/15/2019</a:t>
             </a:fld>
             <a:endParaRPr lang="en-US" dirty="0"/>
           </a:p>
@@ -3245,7 +3250,7 @@
             <a:fld id="{5586B75A-687E-405C-8A0B-8D00578BA2C3}" type="datetimeFigureOut">
               <a:rPr lang="en-US" dirty="0"/>
               <a:pPr/>
-              <a:t>2/12/2019</a:t>
+              <a:t>2/15/2019</a:t>
             </a:fld>
             <a:endParaRPr lang="en-US" dirty="0"/>
           </a:p>
@@ -3890,6 +3895,1033 @@
 </p:sld>
 </file>
 
+<file path=ppt/slides/slide10.xml><?xml version="1.0" encoding="utf-8"?>
+<p:sld xmlns:a="http://schemas.openxmlformats.org/drawingml/2006/main" xmlns:r="http://schemas.openxmlformats.org/officeDocument/2006/relationships" xmlns:p="http://schemas.openxmlformats.org/presentationml/2006/main">
+  <p:cSld>
+    <p:spTree>
+      <p:nvGrpSpPr>
+        <p:cNvPr id="1" name=""/>
+        <p:cNvGrpSpPr/>
+        <p:nvPr/>
+      </p:nvGrpSpPr>
+      <p:grpSpPr>
+        <a:xfrm>
+          <a:off x="0" y="0"/>
+          <a:ext cx="0" cy="0"/>
+          <a:chOff x="0" y="0"/>
+          <a:chExt cx="0" cy="0"/>
+        </a:xfrm>
+      </p:grpSpPr>
+      <p:sp>
+        <p:nvSpPr>
+          <p:cNvPr id="2" name="Titolo 1">
+            <a:extLst>
+              <a:ext uri="{FF2B5EF4-FFF2-40B4-BE49-F238E27FC236}">
+                <a16:creationId xmlns:a16="http://schemas.microsoft.com/office/drawing/2014/main" id="{1582B873-E864-43B7-B99F-EFF037CA4149}"/>
+              </a:ext>
+            </a:extLst>
+          </p:cNvPr>
+          <p:cNvSpPr>
+            <a:spLocks noGrp="1"/>
+          </p:cNvSpPr>
+          <p:nvPr>
+            <p:ph type="title"/>
+          </p:nvPr>
+        </p:nvSpPr>
+        <p:spPr/>
+        <p:txBody>
+          <a:bodyPr/>
+          <a:lstStyle/>
+          <a:p>
+            <a:r>
+              <a:rPr lang="it-IT" dirty="0"/>
+              <a:t>Modello RBF</a:t>
+            </a:r>
+          </a:p>
+        </p:txBody>
+      </p:sp>
+      <p:sp>
+        <p:nvSpPr>
+          <p:cNvPr id="3" name="Segnaposto contenuto 2">
+            <a:extLst>
+              <a:ext uri="{FF2B5EF4-FFF2-40B4-BE49-F238E27FC236}">
+                <a16:creationId xmlns:a16="http://schemas.microsoft.com/office/drawing/2014/main" id="{A8D9C1B6-6298-428C-A487-7A7152C86515}"/>
+              </a:ext>
+            </a:extLst>
+          </p:cNvPr>
+          <p:cNvSpPr>
+            <a:spLocks noGrp="1"/>
+          </p:cNvSpPr>
+          <p:nvPr>
+            <p:ph idx="1"/>
+          </p:nvPr>
+        </p:nvSpPr>
+        <p:spPr/>
+        <p:txBody>
+          <a:bodyPr>
+            <a:normAutofit/>
+          </a:bodyPr>
+          <a:lstStyle/>
+          <a:p>
+            <a:r>
+              <a:rPr lang="it-IT" dirty="0"/>
+              <a:t>C=10 </a:t>
+            </a:r>
+            <a:r>
+              <a:rPr lang="it-IT" dirty="0">
+                <a:sym typeface="Symbol" panose="05050102010706020507" pitchFamily="18" charset="2"/>
+              </a:rPr>
+              <a:t>=0.1 si ripete 7 volte su 10  </a:t>
+            </a:r>
+            <a:r>
+              <a:rPr lang="it-IT" dirty="0"/>
+              <a:t>miglior modello con media degli score </a:t>
+            </a:r>
+            <a:r>
+              <a:rPr lang="it-IT" b="1" dirty="0"/>
+              <a:t>0.9760963002533048 +/-(0.00003.418874531690116)</a:t>
+            </a:r>
+          </a:p>
+          <a:p>
+            <a:pPr marL="0" indent="0">
+              <a:buNone/>
+            </a:pPr>
+            <a:endParaRPr lang="it-IT" dirty="0"/>
+          </a:p>
+          <a:p>
+            <a:pPr marL="0" indent="0">
+              <a:buNone/>
+            </a:pPr>
+            <a:endParaRPr lang="it-IT" dirty="0"/>
+          </a:p>
+          <a:p>
+            <a:pPr marL="0" indent="0">
+              <a:buNone/>
+            </a:pPr>
+            <a:endParaRPr lang="it-IT" dirty="0"/>
+          </a:p>
+          <a:p>
+            <a:pPr marL="0" indent="0">
+              <a:buNone/>
+            </a:pPr>
+            <a:endParaRPr lang="it-IT" dirty="0"/>
+          </a:p>
+          <a:p>
+            <a:pPr marL="0" indent="0">
+              <a:buNone/>
+            </a:pPr>
+            <a:endParaRPr lang="it-IT" dirty="0"/>
+          </a:p>
+          <a:p>
+            <a:pPr marL="0" indent="0">
+              <a:buNone/>
+            </a:pPr>
+            <a:endParaRPr lang="it-IT" dirty="0"/>
+          </a:p>
+          <a:p>
+            <a:pPr marL="0" indent="0">
+              <a:buNone/>
+            </a:pPr>
+            <a:endParaRPr lang="it-IT" dirty="0"/>
+          </a:p>
+          <a:p>
+            <a:pPr marL="0" indent="0">
+              <a:buNone/>
+            </a:pPr>
+            <a:endParaRPr lang="it-IT" dirty="0"/>
+          </a:p>
+          <a:p>
+            <a:pPr marL="0" indent="0">
+              <a:buNone/>
+            </a:pPr>
+            <a:br>
+              <a:rPr lang="it-IT" dirty="0"/>
+            </a:br>
+            <a:endParaRPr lang="it-IT" dirty="0"/>
+          </a:p>
+        </p:txBody>
+      </p:sp>
+      <p:pic>
+        <p:nvPicPr>
+          <p:cNvPr id="3074" name="Picture 2" descr="https://lh4.googleusercontent.com/JJ_SOjxbDpejhx78wBJQVjVAmlGI28_RdU3_D7i190sPOSJ2jsqGwoU0VN8P53vAmLJZ_ADM1vszFgj1gjJIhmUZaT0Tsul-sl-HZCDjmNVWw8vb8hha_jez5C3yhn-3zERWCKYN">
+            <a:extLst>
+              <a:ext uri="{FF2B5EF4-FFF2-40B4-BE49-F238E27FC236}">
+                <a16:creationId xmlns:a16="http://schemas.microsoft.com/office/drawing/2014/main" id="{5438B2E5-F8B0-4A24-A027-1AF36C698C96}"/>
+              </a:ext>
+            </a:extLst>
+          </p:cNvPr>
+          <p:cNvPicPr>
+            <a:picLocks noChangeAspect="1" noChangeArrowheads="1"/>
+          </p:cNvPicPr>
+          <p:nvPr/>
+        </p:nvPicPr>
+        <p:blipFill>
+          <a:blip r:embed="rId2">
+            <a:extLst>
+              <a:ext uri="{28A0092B-C50C-407E-A947-70E740481C1C}">
+                <a14:useLocalDpi xmlns:a14="http://schemas.microsoft.com/office/drawing/2010/main" val="0"/>
+              </a:ext>
+            </a:extLst>
+          </a:blip>
+          <a:srcRect/>
+          <a:stretch>
+            <a:fillRect/>
+          </a:stretch>
+        </p:blipFill>
+        <p:spPr bwMode="auto">
+          <a:xfrm>
+            <a:off x="3587337" y="4133087"/>
+            <a:ext cx="2743200" cy="2390775"/>
+          </a:xfrm>
+          <a:prstGeom prst="rect">
+            <a:avLst/>
+          </a:prstGeom>
+          <a:noFill/>
+          <a:extLst>
+            <a:ext uri="{909E8E84-426E-40DD-AFC4-6F175D3DCCD1}">
+              <a14:hiddenFill xmlns:a14="http://schemas.microsoft.com/office/drawing/2010/main">
+                <a:solidFill>
+                  <a:srgbClr val="FFFFFF"/>
+                </a:solidFill>
+              </a14:hiddenFill>
+            </a:ext>
+          </a:extLst>
+        </p:spPr>
+      </p:pic>
+      <p:graphicFrame>
+        <p:nvGraphicFramePr>
+          <p:cNvPr id="5" name="Tabella 4">
+            <a:extLst>
+              <a:ext uri="{FF2B5EF4-FFF2-40B4-BE49-F238E27FC236}">
+                <a16:creationId xmlns:a16="http://schemas.microsoft.com/office/drawing/2014/main" id="{BF6C24B2-0080-42D2-9C41-9250420A5DE9}"/>
+              </a:ext>
+            </a:extLst>
+          </p:cNvPr>
+          <p:cNvGraphicFramePr>
+            <a:graphicFrameLocks noGrp="1"/>
+          </p:cNvGraphicFramePr>
+          <p:nvPr>
+            <p:extLst>
+              <p:ext uri="{D42A27DB-BD31-4B8C-83A1-F6EECF244321}">
+                <p14:modId xmlns:p14="http://schemas.microsoft.com/office/powerpoint/2010/main" val="1676142808"/>
+              </p:ext>
+            </p:extLst>
+          </p:nvPr>
+        </p:nvGraphicFramePr>
+        <p:xfrm>
+          <a:off x="3869268" y="1769191"/>
+          <a:ext cx="7315199" cy="2296160"/>
+        </p:xfrm>
+        <a:graphic>
+          <a:graphicData uri="http://schemas.openxmlformats.org/drawingml/2006/table">
+            <a:tbl>
+              <a:tblPr firstRow="1" bandRow="1">
+                <a:tableStyleId>{5C22544A-7EE6-4342-B048-85BDC9FD1C3A}</a:tableStyleId>
+              </a:tblPr>
+              <a:tblGrid>
+                <a:gridCol w="1475105">
+                  <a:extLst>
+                    <a:ext uri="{9D8B030D-6E8A-4147-A177-3AD203B41FA5}">
+                      <a16:colId xmlns:a16="http://schemas.microsoft.com/office/drawing/2014/main" val="2015538800"/>
+                    </a:ext>
+                  </a:extLst>
+                </a:gridCol>
+                <a:gridCol w="1421066">
+                  <a:extLst>
+                    <a:ext uri="{9D8B030D-6E8A-4147-A177-3AD203B41FA5}">
+                      <a16:colId xmlns:a16="http://schemas.microsoft.com/office/drawing/2014/main" val="348667406"/>
+                    </a:ext>
+                  </a:extLst>
+                </a:gridCol>
+                <a:gridCol w="4419028">
+                  <a:extLst>
+                    <a:ext uri="{9D8B030D-6E8A-4147-A177-3AD203B41FA5}">
+                      <a16:colId xmlns:a16="http://schemas.microsoft.com/office/drawing/2014/main" val="632916334"/>
+                    </a:ext>
+                  </a:extLst>
+                </a:gridCol>
+              </a:tblGrid>
+              <a:tr h="0">
+                <a:tc>
+                  <a:txBody>
+                    <a:bodyPr/>
+                    <a:lstStyle/>
+                    <a:p>
+                      <a:r>
+                        <a:rPr lang="it-IT" dirty="0"/>
+                        <a:t>Parametri</a:t>
+                      </a:r>
+                    </a:p>
+                  </a:txBody>
+                  <a:tcPr/>
+                </a:tc>
+                <a:tc>
+                  <a:txBody>
+                    <a:bodyPr/>
+                    <a:lstStyle/>
+                    <a:p>
+                      <a:pPr algn="ctr"/>
+                      <a:r>
+                        <a:rPr lang="it-IT" dirty="0"/>
+                        <a:t>Occorrenze</a:t>
+                      </a:r>
+                    </a:p>
+                  </a:txBody>
+                  <a:tcPr/>
+                </a:tc>
+                <a:tc>
+                  <a:txBody>
+                    <a:bodyPr/>
+                    <a:lstStyle/>
+                    <a:p>
+                      <a:r>
+                        <a:rPr lang="it-IT" dirty="0" err="1"/>
+                        <a:t>Accuracy</a:t>
+                      </a:r>
+                      <a:r>
+                        <a:rPr lang="it-IT" dirty="0"/>
+                        <a:t> sul test set</a:t>
+                      </a:r>
+                    </a:p>
+                  </a:txBody>
+                  <a:tcPr/>
+                </a:tc>
+                <a:extLst>
+                  <a:ext uri="{0D108BD9-81ED-4DB2-BD59-A6C34878D82A}">
+                    <a16:rowId xmlns:a16="http://schemas.microsoft.com/office/drawing/2014/main" val="3666292966"/>
+                  </a:ext>
+                </a:extLst>
+              </a:tr>
+              <a:tr h="370840">
+                <a:tc>
+                  <a:txBody>
+                    <a:bodyPr/>
+                    <a:lstStyle/>
+                    <a:p>
+                      <a:r>
+                        <a:rPr lang="it-IT" dirty="0"/>
+                        <a:t>C=10 </a:t>
+                      </a:r>
+                      <a:r>
+                        <a:rPr lang="it-IT" dirty="0">
+                          <a:sym typeface="Symbol" panose="05050102010706020507" pitchFamily="18" charset="2"/>
+                        </a:rPr>
+                        <a:t>=0.1</a:t>
+                      </a:r>
+                      <a:endParaRPr lang="it-IT" dirty="0"/>
+                    </a:p>
+                  </a:txBody>
+                  <a:tcPr/>
+                </a:tc>
+                <a:tc>
+                  <a:txBody>
+                    <a:bodyPr/>
+                    <a:lstStyle/>
+                    <a:p>
+                      <a:pPr algn="ctr"/>
+                      <a:r>
+                        <a:rPr lang="it-IT" dirty="0"/>
+                        <a:t>7</a:t>
+                      </a:r>
+                    </a:p>
+                  </a:txBody>
+                  <a:tcPr/>
+                </a:tc>
+                <a:tc>
+                  <a:txBody>
+                    <a:bodyPr/>
+                    <a:lstStyle/>
+                    <a:p>
+                      <a:r>
+                        <a:rPr lang="it-IT" b="0" dirty="0"/>
+                        <a:t>[0.9773960216998192, 0.9810126582278481, 0.9719710669077758, 0.9819168173598554, 0.9828209764918626, 0.9710407239819004, 0.9665158371040724]</a:t>
+                      </a:r>
+                    </a:p>
+                  </a:txBody>
+                  <a:tcPr/>
+                </a:tc>
+                <a:extLst>
+                  <a:ext uri="{0D108BD9-81ED-4DB2-BD59-A6C34878D82A}">
+                    <a16:rowId xmlns:a16="http://schemas.microsoft.com/office/drawing/2014/main" val="4201979726"/>
+                  </a:ext>
+                </a:extLst>
+              </a:tr>
+              <a:tr h="370840">
+                <a:tc>
+                  <a:txBody>
+                    <a:bodyPr/>
+                    <a:lstStyle/>
+                    <a:p>
+                      <a:r>
+                        <a:rPr lang="it-IT" dirty="0"/>
+                        <a:t>C=100 </a:t>
+                      </a:r>
+                      <a:r>
+                        <a:rPr lang="it-IT" dirty="0">
+                          <a:sym typeface="Symbol" panose="05050102010706020507" pitchFamily="18" charset="2"/>
+                        </a:rPr>
+                        <a:t>=0.1</a:t>
+                      </a:r>
+                      <a:endParaRPr lang="it-IT" dirty="0"/>
+                    </a:p>
+                  </a:txBody>
+                  <a:tcPr/>
+                </a:tc>
+                <a:tc>
+                  <a:txBody>
+                    <a:bodyPr/>
+                    <a:lstStyle/>
+                    <a:p>
+                      <a:pPr algn="ctr"/>
+                      <a:r>
+                        <a:rPr lang="it-IT" dirty="0"/>
+                        <a:t>2</a:t>
+                      </a:r>
+                    </a:p>
+                  </a:txBody>
+                  <a:tcPr/>
+                </a:tc>
+                <a:tc>
+                  <a:txBody>
+                    <a:bodyPr/>
+                    <a:lstStyle/>
+                    <a:p>
+                      <a:r>
+                        <a:rPr lang="it-IT" dirty="0"/>
+                        <a:t>[0.9484162895927601, 0.9565610859728507</a:t>
+                      </a:r>
+                    </a:p>
+                  </a:txBody>
+                  <a:tcPr/>
+                </a:tc>
+                <a:extLst>
+                  <a:ext uri="{0D108BD9-81ED-4DB2-BD59-A6C34878D82A}">
+                    <a16:rowId xmlns:a16="http://schemas.microsoft.com/office/drawing/2014/main" val="3142421780"/>
+                  </a:ext>
+                </a:extLst>
+              </a:tr>
+              <a:tr h="370840">
+                <a:tc>
+                  <a:txBody>
+                    <a:bodyPr/>
+                    <a:lstStyle/>
+                    <a:p>
+                      <a:r>
+                        <a:rPr lang="it-IT" dirty="0"/>
+                        <a:t>C=1000 </a:t>
+                      </a:r>
+                      <a:r>
+                        <a:rPr lang="it-IT" dirty="0">
+                          <a:sym typeface="Symbol" panose="05050102010706020507" pitchFamily="18" charset="2"/>
+                        </a:rPr>
+                        <a:t>=0.1</a:t>
+                      </a:r>
+                      <a:endParaRPr lang="it-IT" dirty="0"/>
+                    </a:p>
+                  </a:txBody>
+                  <a:tcPr/>
+                </a:tc>
+                <a:tc>
+                  <a:txBody>
+                    <a:bodyPr/>
+                    <a:lstStyle/>
+                    <a:p>
+                      <a:pPr algn="ctr"/>
+                      <a:r>
+                        <a:rPr lang="it-IT" dirty="0"/>
+                        <a:t>1</a:t>
+                      </a:r>
+                    </a:p>
+                  </a:txBody>
+                  <a:tcPr/>
+                </a:tc>
+                <a:tc>
+                  <a:txBody>
+                    <a:bodyPr/>
+                    <a:lstStyle/>
+                    <a:p>
+                      <a:r>
+                        <a:rPr lang="it-IT" dirty="0"/>
+                        <a:t>[0.9493212669683257]</a:t>
+                      </a:r>
+                    </a:p>
+                  </a:txBody>
+                  <a:tcPr/>
+                </a:tc>
+                <a:extLst>
+                  <a:ext uri="{0D108BD9-81ED-4DB2-BD59-A6C34878D82A}">
+                    <a16:rowId xmlns:a16="http://schemas.microsoft.com/office/drawing/2014/main" val="3152955369"/>
+                  </a:ext>
+                </a:extLst>
+              </a:tr>
+            </a:tbl>
+          </a:graphicData>
+        </a:graphic>
+      </p:graphicFrame>
+      <p:sp>
+        <p:nvSpPr>
+          <p:cNvPr id="6" name="Rettangolo 5">
+            <a:extLst>
+              <a:ext uri="{FF2B5EF4-FFF2-40B4-BE49-F238E27FC236}">
+                <a16:creationId xmlns:a16="http://schemas.microsoft.com/office/drawing/2014/main" id="{B59453FB-27A8-45F7-A7A7-E48BFF907674}"/>
+              </a:ext>
+            </a:extLst>
+          </p:cNvPr>
+          <p:cNvSpPr/>
+          <p:nvPr/>
+        </p:nvSpPr>
+        <p:spPr>
+          <a:xfrm>
+            <a:off x="6457537" y="4714037"/>
+            <a:ext cx="4542205" cy="738664"/>
+          </a:xfrm>
+          <a:prstGeom prst="rect">
+            <a:avLst/>
+          </a:prstGeom>
+        </p:spPr>
+        <p:txBody>
+          <a:bodyPr wrap="none">
+            <a:spAutoFit/>
+          </a:bodyPr>
+          <a:lstStyle/>
+          <a:p>
+            <a:r>
+              <a:rPr lang="it-IT" sz="1400" dirty="0">
+                <a:solidFill>
+                  <a:schemeClr val="bg1">
+                    <a:lumMod val="65000"/>
+                  </a:schemeClr>
+                </a:solidFill>
+              </a:rPr>
+              <a:t>Una delle </a:t>
+            </a:r>
+            <a:r>
+              <a:rPr lang="it-IT" sz="1400" dirty="0" err="1">
+                <a:solidFill>
+                  <a:schemeClr val="bg1">
+                    <a:lumMod val="65000"/>
+                  </a:schemeClr>
+                </a:solidFill>
+              </a:rPr>
+              <a:t>heatmap</a:t>
+            </a:r>
+            <a:r>
+              <a:rPr lang="it-IT" sz="1400" dirty="0">
+                <a:solidFill>
+                  <a:schemeClr val="bg1">
+                    <a:lumMod val="65000"/>
+                  </a:schemeClr>
+                </a:solidFill>
+              </a:rPr>
+              <a:t> stampate ad ogni iterazione</a:t>
+            </a:r>
+            <a:br>
+              <a:rPr lang="it-IT" sz="1400" dirty="0">
+                <a:solidFill>
+                  <a:schemeClr val="bg1">
+                    <a:lumMod val="65000"/>
+                  </a:schemeClr>
+                </a:solidFill>
+              </a:rPr>
+            </a:br>
+            <a:r>
+              <a:rPr lang="it-IT" sz="1400" dirty="0">
+                <a:solidFill>
+                  <a:schemeClr val="bg1">
+                    <a:lumMod val="65000"/>
+                  </a:schemeClr>
+                </a:solidFill>
+              </a:rPr>
+              <a:t>per visualizzare graficamente la migliore combinazione </a:t>
+            </a:r>
+          </a:p>
+          <a:p>
+            <a:r>
+              <a:rPr lang="it-IT" sz="1400" dirty="0">
+                <a:solidFill>
+                  <a:schemeClr val="bg1">
+                    <a:lumMod val="65000"/>
+                  </a:schemeClr>
+                </a:solidFill>
+              </a:rPr>
+              <a:t>di parametri in termini di </a:t>
+            </a:r>
+            <a:r>
+              <a:rPr lang="it-IT" sz="1400" dirty="0" err="1">
+                <a:solidFill>
+                  <a:schemeClr val="bg1">
+                    <a:lumMod val="65000"/>
+                  </a:schemeClr>
+                </a:solidFill>
+              </a:rPr>
+              <a:t>accuracy</a:t>
+            </a:r>
+            <a:r>
+              <a:rPr lang="it-IT" sz="1400" dirty="0">
+                <a:solidFill>
+                  <a:schemeClr val="bg1">
+                    <a:lumMod val="65000"/>
+                  </a:schemeClr>
+                </a:solidFill>
+              </a:rPr>
+              <a:t> media sui </a:t>
+            </a:r>
+            <a:r>
+              <a:rPr lang="it-IT" sz="1400" dirty="0" err="1">
+                <a:solidFill>
+                  <a:schemeClr val="bg1">
+                    <a:lumMod val="65000"/>
+                  </a:schemeClr>
+                </a:solidFill>
+              </a:rPr>
+              <a:t>validation</a:t>
+            </a:r>
+            <a:r>
+              <a:rPr lang="it-IT" sz="1400" dirty="0">
+                <a:solidFill>
+                  <a:schemeClr val="bg1">
+                    <a:lumMod val="65000"/>
+                  </a:schemeClr>
+                </a:solidFill>
+              </a:rPr>
+              <a:t> sets </a:t>
+            </a:r>
+          </a:p>
+        </p:txBody>
+      </p:sp>
+    </p:spTree>
+    <p:extLst>
+      <p:ext uri="{BB962C8B-B14F-4D97-AF65-F5344CB8AC3E}">
+        <p14:creationId xmlns:p14="http://schemas.microsoft.com/office/powerpoint/2010/main" val="3688607951"/>
+      </p:ext>
+    </p:extLst>
+  </p:cSld>
+  <p:clrMapOvr>
+    <a:masterClrMapping/>
+  </p:clrMapOvr>
+</p:sld>
+</file>
+
+<file path=ppt/slides/slide11.xml><?xml version="1.0" encoding="utf-8"?>
+<p:sld xmlns:a="http://schemas.openxmlformats.org/drawingml/2006/main" xmlns:r="http://schemas.openxmlformats.org/officeDocument/2006/relationships" xmlns:p="http://schemas.openxmlformats.org/presentationml/2006/main">
+  <p:cSld>
+    <p:spTree>
+      <p:nvGrpSpPr>
+        <p:cNvPr id="1" name=""/>
+        <p:cNvGrpSpPr/>
+        <p:nvPr/>
+      </p:nvGrpSpPr>
+      <p:grpSpPr>
+        <a:xfrm>
+          <a:off x="0" y="0"/>
+          <a:ext cx="0" cy="0"/>
+          <a:chOff x="0" y="0"/>
+          <a:chExt cx="0" cy="0"/>
+        </a:xfrm>
+      </p:grpSpPr>
+      <p:sp>
+        <p:nvSpPr>
+          <p:cNvPr id="2" name="Titolo 1">
+            <a:extLst>
+              <a:ext uri="{FF2B5EF4-FFF2-40B4-BE49-F238E27FC236}">
+                <a16:creationId xmlns:a16="http://schemas.microsoft.com/office/drawing/2014/main" id="{1582B873-E864-43B7-B99F-EFF037CA4149}"/>
+              </a:ext>
+            </a:extLst>
+          </p:cNvPr>
+          <p:cNvSpPr>
+            <a:spLocks noGrp="1"/>
+          </p:cNvSpPr>
+          <p:nvPr>
+            <p:ph type="title"/>
+          </p:nvPr>
+        </p:nvSpPr>
+        <p:spPr/>
+        <p:txBody>
+          <a:bodyPr/>
+          <a:lstStyle/>
+          <a:p>
+            <a:r>
+              <a:rPr lang="it-IT" dirty="0"/>
+              <a:t>Modello RBF</a:t>
+            </a:r>
+          </a:p>
+        </p:txBody>
+      </p:sp>
+      <p:pic>
+        <p:nvPicPr>
+          <p:cNvPr id="4098" name="Picture 2" descr="https://lh5.googleusercontent.com/PiEjKPwyky--iXbLYsSC8f8rFkeEXYX_JRKNrBuHeKLK87lHQGwXYzPYaYS5awNS1IOPLlUDZY-blaRibMwp-PNELO04vCzDDpqAGeI1_VwqtlaVUekBKgOLbeTNouzWPGubi03o">
+            <a:extLst>
+              <a:ext uri="{FF2B5EF4-FFF2-40B4-BE49-F238E27FC236}">
+                <a16:creationId xmlns:a16="http://schemas.microsoft.com/office/drawing/2014/main" id="{5DC388DA-FD00-4D15-9027-DB1D354C796E}"/>
+              </a:ext>
+            </a:extLst>
+          </p:cNvPr>
+          <p:cNvPicPr>
+            <a:picLocks noChangeAspect="1" noChangeArrowheads="1"/>
+          </p:cNvPicPr>
+          <p:nvPr/>
+        </p:nvPicPr>
+        <p:blipFill>
+          <a:blip r:embed="rId2">
+            <a:extLst>
+              <a:ext uri="{28A0092B-C50C-407E-A947-70E740481C1C}">
+                <a14:useLocalDpi xmlns:a14="http://schemas.microsoft.com/office/drawing/2010/main" val="0"/>
+              </a:ext>
+            </a:extLst>
+          </a:blip>
+          <a:srcRect/>
+          <a:stretch>
+            <a:fillRect/>
+          </a:stretch>
+        </p:blipFill>
+        <p:spPr bwMode="auto">
+          <a:xfrm>
+            <a:off x="7652231" y="681202"/>
+            <a:ext cx="2775238" cy="2008651"/>
+          </a:xfrm>
+          <a:prstGeom prst="rect">
+            <a:avLst/>
+          </a:prstGeom>
+          <a:noFill/>
+          <a:extLst>
+            <a:ext uri="{909E8E84-426E-40DD-AFC4-6F175D3DCCD1}">
+              <a14:hiddenFill xmlns:a14="http://schemas.microsoft.com/office/drawing/2010/main">
+                <a:solidFill>
+                  <a:srgbClr val="FFFFFF"/>
+                </a:solidFill>
+              </a14:hiddenFill>
+            </a:ext>
+          </a:extLst>
+        </p:spPr>
+      </p:pic>
+      <p:pic>
+        <p:nvPicPr>
+          <p:cNvPr id="4110" name="Picture 14" descr="https://lh3.googleusercontent.com/KOTvSSi758ePkp965CZISbD6jsWGMctzS-NaLGJFQy2zociZNjMPjejTQ7zsefykMGCTISFNsc4eovNRQa47VPCkeTDx5tQyKoBH22goEOj7QqZaT9bqiYXTRY9bgJHltcaQf_H7">
+            <a:extLst>
+              <a:ext uri="{FF2B5EF4-FFF2-40B4-BE49-F238E27FC236}">
+                <a16:creationId xmlns:a16="http://schemas.microsoft.com/office/drawing/2014/main" id="{D2162411-9065-453A-BAC2-FCBFBC8E914D}"/>
+              </a:ext>
+            </a:extLst>
+          </p:cNvPr>
+          <p:cNvPicPr>
+            <a:picLocks noChangeAspect="1" noChangeArrowheads="1"/>
+          </p:cNvPicPr>
+          <p:nvPr/>
+        </p:nvPicPr>
+        <p:blipFill>
+          <a:blip r:embed="rId3">
+            <a:extLst>
+              <a:ext uri="{28A0092B-C50C-407E-A947-70E740481C1C}">
+                <a14:useLocalDpi xmlns:a14="http://schemas.microsoft.com/office/drawing/2010/main" val="0"/>
+              </a:ext>
+            </a:extLst>
+          </a:blip>
+          <a:srcRect/>
+          <a:stretch>
+            <a:fillRect/>
+          </a:stretch>
+        </p:blipFill>
+        <p:spPr bwMode="auto">
+          <a:xfrm>
+            <a:off x="4268643" y="681202"/>
+            <a:ext cx="2724150" cy="1971675"/>
+          </a:xfrm>
+          <a:prstGeom prst="rect">
+            <a:avLst/>
+          </a:prstGeom>
+          <a:noFill/>
+          <a:extLst>
+            <a:ext uri="{909E8E84-426E-40DD-AFC4-6F175D3DCCD1}">
+              <a14:hiddenFill xmlns:a14="http://schemas.microsoft.com/office/drawing/2010/main">
+                <a:solidFill>
+                  <a:srgbClr val="FFFFFF"/>
+                </a:solidFill>
+              </a14:hiddenFill>
+            </a:ext>
+          </a:extLst>
+        </p:spPr>
+      </p:pic>
+      <p:pic>
+        <p:nvPicPr>
+          <p:cNvPr id="4104" name="Picture 8" descr="https://lh5.googleusercontent.com/0PUTiiTVT5p3ykN8WdvYrM2Inaktvb50-8VHQQyh8qlSjNlPmfWG2BQBPNEUnnDyJ6p3j4t5E5jQxivkgQZAyvAn7W9xfhdBuzd9IsPukWUEjXcOFH3eJuXCBuXzlYE3eUfLVomb">
+            <a:extLst>
+              <a:ext uri="{FF2B5EF4-FFF2-40B4-BE49-F238E27FC236}">
+                <a16:creationId xmlns:a16="http://schemas.microsoft.com/office/drawing/2014/main" id="{5B7F9CC3-469F-4FEE-B92C-1963A1C22E7D}"/>
+              </a:ext>
+            </a:extLst>
+          </p:cNvPr>
+          <p:cNvPicPr>
+            <a:picLocks noChangeAspect="1" noChangeArrowheads="1"/>
+          </p:cNvPicPr>
+          <p:nvPr/>
+        </p:nvPicPr>
+        <p:blipFill>
+          <a:blip r:embed="rId4">
+            <a:extLst>
+              <a:ext uri="{28A0092B-C50C-407E-A947-70E740481C1C}">
+                <a14:useLocalDpi xmlns:a14="http://schemas.microsoft.com/office/drawing/2010/main" val="0"/>
+              </a:ext>
+            </a:extLst>
+          </a:blip>
+          <a:srcRect/>
+          <a:stretch>
+            <a:fillRect/>
+          </a:stretch>
+        </p:blipFill>
+        <p:spPr bwMode="auto">
+          <a:xfrm>
+            <a:off x="4268643" y="2652877"/>
+            <a:ext cx="2724150" cy="1971675"/>
+          </a:xfrm>
+          <a:prstGeom prst="rect">
+            <a:avLst/>
+          </a:prstGeom>
+          <a:noFill/>
+          <a:extLst>
+            <a:ext uri="{909E8E84-426E-40DD-AFC4-6F175D3DCCD1}">
+              <a14:hiddenFill xmlns:a14="http://schemas.microsoft.com/office/drawing/2010/main">
+                <a:solidFill>
+                  <a:srgbClr val="FFFFFF"/>
+                </a:solidFill>
+              </a14:hiddenFill>
+            </a:ext>
+          </a:extLst>
+        </p:spPr>
+      </p:pic>
+      <p:pic>
+        <p:nvPicPr>
+          <p:cNvPr id="4102" name="Picture 6" descr="https://lh3.googleusercontent.com/sMPCco51S4V8NKqhMxAmOUAMe9ZvSm23MKutDkk6CSeMl8U-78tRLU_H_c_nfxpfo4Z8VdF5OcONVFYQ6jZogQcNEtWqQnWN6MIfWQ5FppqF56VvwOsPw54VR9fhZ8ATVvvCaYvM">
+            <a:extLst>
+              <a:ext uri="{FF2B5EF4-FFF2-40B4-BE49-F238E27FC236}">
+                <a16:creationId xmlns:a16="http://schemas.microsoft.com/office/drawing/2014/main" id="{D37BB759-B2B7-48BE-9ACF-B02AC776DE15}"/>
+              </a:ext>
+            </a:extLst>
+          </p:cNvPr>
+          <p:cNvPicPr>
+            <a:picLocks noChangeAspect="1" noChangeArrowheads="1"/>
+          </p:cNvPicPr>
+          <p:nvPr/>
+        </p:nvPicPr>
+        <p:blipFill>
+          <a:blip r:embed="rId5">
+            <a:extLst>
+              <a:ext uri="{28A0092B-C50C-407E-A947-70E740481C1C}">
+                <a14:useLocalDpi xmlns:a14="http://schemas.microsoft.com/office/drawing/2010/main" val="0"/>
+              </a:ext>
+            </a:extLst>
+          </a:blip>
+          <a:srcRect/>
+          <a:stretch>
+            <a:fillRect/>
+          </a:stretch>
+        </p:blipFill>
+        <p:spPr bwMode="auto">
+          <a:xfrm>
+            <a:off x="7703319" y="2676602"/>
+            <a:ext cx="2724150" cy="1971675"/>
+          </a:xfrm>
+          <a:prstGeom prst="rect">
+            <a:avLst/>
+          </a:prstGeom>
+          <a:noFill/>
+          <a:extLst>
+            <a:ext uri="{909E8E84-426E-40DD-AFC4-6F175D3DCCD1}">
+              <a14:hiddenFill xmlns:a14="http://schemas.microsoft.com/office/drawing/2010/main">
+                <a:solidFill>
+                  <a:srgbClr val="FFFFFF"/>
+                </a:solidFill>
+              </a14:hiddenFill>
+            </a:ext>
+          </a:extLst>
+        </p:spPr>
+      </p:pic>
+      <p:pic>
+        <p:nvPicPr>
+          <p:cNvPr id="4112" name="Picture 16" descr="https://lh5.googleusercontent.com/zb-d3kAjdo1LzQ9EYO53rw0jNGCbdq5qKyuahlwWpg_rTu2NWx9j2vDJSwf7BUbq-1sNLakLe1sJm8EID3b9XB8P3TBKrKogwwuXkx3R3-fPXJzVBZCyTOkv9VLUoR5veb2cmPfK">
+            <a:extLst>
+              <a:ext uri="{FF2B5EF4-FFF2-40B4-BE49-F238E27FC236}">
+                <a16:creationId xmlns:a16="http://schemas.microsoft.com/office/drawing/2014/main" id="{28E4B15C-479D-4167-B598-45E129B5AC8C}"/>
+              </a:ext>
+            </a:extLst>
+          </p:cNvPr>
+          <p:cNvPicPr>
+            <a:picLocks noChangeAspect="1" noChangeArrowheads="1"/>
+          </p:cNvPicPr>
+          <p:nvPr/>
+        </p:nvPicPr>
+        <p:blipFill>
+          <a:blip r:embed="rId6">
+            <a:extLst>
+              <a:ext uri="{28A0092B-C50C-407E-A947-70E740481C1C}">
+                <a14:useLocalDpi xmlns:a14="http://schemas.microsoft.com/office/drawing/2010/main" val="0"/>
+              </a:ext>
+            </a:extLst>
+          </a:blip>
+          <a:srcRect/>
+          <a:stretch>
+            <a:fillRect/>
+          </a:stretch>
+        </p:blipFill>
+        <p:spPr bwMode="auto">
+          <a:xfrm>
+            <a:off x="7703319" y="4648277"/>
+            <a:ext cx="2724150" cy="1971675"/>
+          </a:xfrm>
+          <a:prstGeom prst="rect">
+            <a:avLst/>
+          </a:prstGeom>
+          <a:noFill/>
+          <a:extLst>
+            <a:ext uri="{909E8E84-426E-40DD-AFC4-6F175D3DCCD1}">
+              <a14:hiddenFill xmlns:a14="http://schemas.microsoft.com/office/drawing/2010/main">
+                <a:solidFill>
+                  <a:srgbClr val="FFFFFF"/>
+                </a:solidFill>
+              </a14:hiddenFill>
+            </a:ext>
+          </a:extLst>
+        </p:spPr>
+      </p:pic>
+      <p:pic>
+        <p:nvPicPr>
+          <p:cNvPr id="4114" name="Picture 18" descr="https://lh4.googleusercontent.com/iuUv9nFV6stY9DeEWtd5yXiMab0RaI0NKW6efldwsKhowkm5wE2YlxQOeJYuDhQLu_RqY0wiF2dhiAOmmfbsLV38DJp4EhLG-_l-aLb6amBhtb-JoB2ZQlO0_Td0izbJ0qesjBL5">
+            <a:extLst>
+              <a:ext uri="{FF2B5EF4-FFF2-40B4-BE49-F238E27FC236}">
+                <a16:creationId xmlns:a16="http://schemas.microsoft.com/office/drawing/2014/main" id="{28396728-DD67-43B6-BB1B-2AEBEFFA1E96}"/>
+              </a:ext>
+            </a:extLst>
+          </p:cNvPr>
+          <p:cNvPicPr>
+            <a:picLocks noChangeAspect="1" noChangeArrowheads="1"/>
+          </p:cNvPicPr>
+          <p:nvPr/>
+        </p:nvPicPr>
+        <p:blipFill>
+          <a:blip r:embed="rId7">
+            <a:extLst>
+              <a:ext uri="{28A0092B-C50C-407E-A947-70E740481C1C}">
+                <a14:useLocalDpi xmlns:a14="http://schemas.microsoft.com/office/drawing/2010/main" val="0"/>
+              </a:ext>
+            </a:extLst>
+          </a:blip>
+          <a:srcRect/>
+          <a:stretch>
+            <a:fillRect/>
+          </a:stretch>
+        </p:blipFill>
+        <p:spPr bwMode="auto">
+          <a:xfrm>
+            <a:off x="4268643" y="4611300"/>
+            <a:ext cx="2724150" cy="1971675"/>
+          </a:xfrm>
+          <a:prstGeom prst="rect">
+            <a:avLst/>
+          </a:prstGeom>
+          <a:noFill/>
+          <a:extLst>
+            <a:ext uri="{909E8E84-426E-40DD-AFC4-6F175D3DCCD1}">
+              <a14:hiddenFill xmlns:a14="http://schemas.microsoft.com/office/drawing/2010/main">
+                <a:solidFill>
+                  <a:srgbClr val="FFFFFF"/>
+                </a:solidFill>
+              </a14:hiddenFill>
+            </a:ext>
+          </a:extLst>
+        </p:spPr>
+      </p:pic>
+    </p:spTree>
+    <p:extLst>
+      <p:ext uri="{BB962C8B-B14F-4D97-AF65-F5344CB8AC3E}">
+        <p14:creationId xmlns:p14="http://schemas.microsoft.com/office/powerpoint/2010/main" val="2846976588"/>
+      </p:ext>
+    </p:extLst>
+  </p:cSld>
+  <p:clrMapOvr>
+    <a:masterClrMapping/>
+  </p:clrMapOvr>
+</p:sld>
+</file>
+
+<file path=ppt/slides/slide12.xml><?xml version="1.0" encoding="utf-8"?>
+<p:sld xmlns:a="http://schemas.openxmlformats.org/drawingml/2006/main" xmlns:r="http://schemas.openxmlformats.org/officeDocument/2006/relationships" xmlns:p="http://schemas.openxmlformats.org/presentationml/2006/main">
+  <p:cSld>
+    <p:spTree>
+      <p:nvGrpSpPr>
+        <p:cNvPr id="1" name=""/>
+        <p:cNvGrpSpPr/>
+        <p:nvPr/>
+      </p:nvGrpSpPr>
+      <p:grpSpPr>
+        <a:xfrm>
+          <a:off x="0" y="0"/>
+          <a:ext cx="0" cy="0"/>
+          <a:chOff x="0" y="0"/>
+          <a:chExt cx="0" cy="0"/>
+        </a:xfrm>
+      </p:grpSpPr>
+      <p:sp>
+        <p:nvSpPr>
+          <p:cNvPr id="2" name="Titolo 1">
+            <a:extLst>
+              <a:ext uri="{FF2B5EF4-FFF2-40B4-BE49-F238E27FC236}">
+                <a16:creationId xmlns:a16="http://schemas.microsoft.com/office/drawing/2014/main" id="{76D1FB3F-80FD-4ACE-8FCB-730CE7586359}"/>
+              </a:ext>
+            </a:extLst>
+          </p:cNvPr>
+          <p:cNvSpPr>
+            <a:spLocks noGrp="1"/>
+          </p:cNvSpPr>
+          <p:nvPr>
+            <p:ph type="title"/>
+          </p:nvPr>
+        </p:nvSpPr>
+        <p:spPr/>
+        <p:txBody>
+          <a:bodyPr/>
+          <a:lstStyle/>
+          <a:p>
+            <a:endParaRPr lang="it-IT" dirty="0"/>
+          </a:p>
+        </p:txBody>
+      </p:sp>
+      <p:sp>
+        <p:nvSpPr>
+          <p:cNvPr id="3" name="Segnaposto testo 2">
+            <a:extLst>
+              <a:ext uri="{FF2B5EF4-FFF2-40B4-BE49-F238E27FC236}">
+                <a16:creationId xmlns:a16="http://schemas.microsoft.com/office/drawing/2014/main" id="{5C124C86-3F43-4B81-8F3F-2101BCB75582}"/>
+              </a:ext>
+            </a:extLst>
+          </p:cNvPr>
+          <p:cNvSpPr>
+            <a:spLocks noGrp="1"/>
+          </p:cNvSpPr>
+          <p:nvPr>
+            <p:ph type="body" idx="1"/>
+          </p:nvPr>
+        </p:nvSpPr>
+        <p:spPr/>
+        <p:txBody>
+          <a:bodyPr/>
+          <a:lstStyle/>
+          <a:p>
+            <a:endParaRPr lang="it-IT" dirty="0"/>
+          </a:p>
+        </p:txBody>
+      </p:sp>
+    </p:spTree>
+    <p:extLst>
+      <p:ext uri="{BB962C8B-B14F-4D97-AF65-F5344CB8AC3E}">
+        <p14:creationId xmlns:p14="http://schemas.microsoft.com/office/powerpoint/2010/main" val="2802610556"/>
+      </p:ext>
+    </p:extLst>
+  </p:cSld>
+  <p:clrMapOvr>
+    <a:masterClrMapping/>
+  </p:clrMapOvr>
+</p:sld>
+</file>
+
 <file path=ppt/slides/slide2.xml><?xml version="1.0" encoding="utf-8"?>
 <p:sld xmlns:a="http://schemas.openxmlformats.org/drawingml/2006/main" xmlns:r="http://schemas.openxmlformats.org/officeDocument/2006/relationships" xmlns:p="http://schemas.openxmlformats.org/presentationml/2006/main">
   <p:cSld>
@@ -4230,94 +5262,1692 @@
           </a:p>
         </p:txBody>
       </p:sp>
-      <p:sp>
-        <p:nvSpPr>
-          <p:cNvPr id="3" name="Segnaposto contenuto 2">
+      <p:graphicFrame>
+        <p:nvGraphicFramePr>
+          <p:cNvPr id="7" name="Segnaposto contenuto 6">
             <a:extLst>
               <a:ext uri="{FF2B5EF4-FFF2-40B4-BE49-F238E27FC236}">
-                <a16:creationId xmlns:a16="http://schemas.microsoft.com/office/drawing/2014/main" id="{A8D9C1B6-6298-428C-A487-7A7152C86515}"/>
+                <a16:creationId xmlns:a16="http://schemas.microsoft.com/office/drawing/2014/main" id="{4A0FED27-4CDD-4EC8-90DD-D7294F7F9A56}"/>
               </a:ext>
             </a:extLst>
           </p:cNvPr>
-          <p:cNvSpPr>
-            <a:spLocks noGrp="1"/>
-          </p:cNvSpPr>
+          <p:cNvGraphicFramePr>
+            <a:graphicFrameLocks noGrp="1"/>
+          </p:cNvGraphicFramePr>
           <p:nvPr>
             <p:ph idx="1"/>
-          </p:nvPr>
-        </p:nvSpPr>
-        <p:spPr/>
-        <p:txBody>
-          <a:bodyPr>
-            <a:normAutofit/>
-          </a:bodyPr>
-          <a:lstStyle/>
-          <a:p>
-            <a:endParaRPr lang="it-IT" dirty="0"/>
-          </a:p>
-          <a:p>
-            <a:r>
-              <a:rPr lang="it-IT" dirty="0"/>
-              <a:t>Controllo di eventuali dati mancanti o trascritti in modo errato</a:t>
-            </a:r>
-          </a:p>
-          <a:p>
-            <a:r>
-              <a:rPr lang="it-IT" dirty="0"/>
-              <a:t>Nessuna normalizzazione (valori già compresi tra -1 e 1)</a:t>
-            </a:r>
-          </a:p>
-          <a:p>
-            <a:r>
-              <a:rPr lang="it-IT" b="1" strike="sngStrike" dirty="0"/>
-              <a:t>Test set 20% </a:t>
-            </a:r>
-            <a:r>
-              <a:rPr lang="it-IT" strike="sngStrike" dirty="0"/>
-              <a:t>del dataset, tenuto da parte durante la scelta dei miglior </a:t>
-            </a:r>
-            <a:r>
-              <a:rPr lang="it-IT" strike="sngStrike" dirty="0" err="1"/>
-              <a:t>iper</a:t>
-            </a:r>
-            <a:r>
-              <a:rPr lang="it-IT" strike="sngStrike" dirty="0"/>
-              <a:t>-parametri ed utilizzato successivamente per misurare l’accuratezza del miglior modello</a:t>
-            </a:r>
-          </a:p>
-          <a:p>
-            <a:r>
-              <a:rPr lang="it-IT" dirty="0"/>
-              <a:t>Elevata dimensionalità che preclude una rappresentazione grafica </a:t>
-            </a:r>
-            <a:r>
-              <a:rPr lang="it-IT" dirty="0">
-                <a:sym typeface="Symbol" panose="05050102010706020507" pitchFamily="18" charset="2"/>
-              </a:rPr>
-              <a:t> </a:t>
-            </a:r>
-            <a:r>
-              <a:rPr lang="it-IT" dirty="0"/>
-              <a:t>rappresentazione grafica della distribuzione di ogni feature tramite </a:t>
-            </a:r>
-            <a:r>
-              <a:rPr lang="it-IT" b="1" dirty="0"/>
-              <a:t>istogrammi impilati</a:t>
-            </a:r>
-            <a:r>
-              <a:rPr lang="it-IT" dirty="0"/>
-              <a:t>, che mostrano anche la proporzione tra le etichette</a:t>
-            </a:r>
-          </a:p>
-          <a:p>
-            <a:endParaRPr lang="it-IT" dirty="0"/>
-          </a:p>
-        </p:txBody>
-      </p:sp>
+            <p:extLst>
+              <p:ext uri="{D42A27DB-BD31-4B8C-83A1-F6EECF244321}">
+                <p14:modId xmlns:p14="http://schemas.microsoft.com/office/powerpoint/2010/main" val="1839243060"/>
+              </p:ext>
+            </p:extLst>
+          </p:nvPr>
+        </p:nvGraphicFramePr>
+        <p:xfrm>
+          <a:off x="3868738" y="643128"/>
+          <a:ext cx="3495783" cy="5863198"/>
+        </p:xfrm>
+        <a:graphic>
+          <a:graphicData uri="http://schemas.openxmlformats.org/drawingml/2006/table">
+            <a:tbl>
+              <a:tblPr firstRow="1" bandRow="1">
+                <a:tableStyleId>{5C22544A-7EE6-4342-B048-85BDC9FD1C3A}</a:tableStyleId>
+              </a:tblPr>
+              <a:tblGrid>
+                <a:gridCol w="360680">
+                  <a:extLst>
+                    <a:ext uri="{9D8B030D-6E8A-4147-A177-3AD203B41FA5}">
+                      <a16:colId xmlns:a16="http://schemas.microsoft.com/office/drawing/2014/main" val="1316119872"/>
+                    </a:ext>
+                  </a:extLst>
+                </a:gridCol>
+                <a:gridCol w="2179849">
+                  <a:extLst>
+                    <a:ext uri="{9D8B030D-6E8A-4147-A177-3AD203B41FA5}">
+                      <a16:colId xmlns:a16="http://schemas.microsoft.com/office/drawing/2014/main" val="428350377"/>
+                    </a:ext>
+                  </a:extLst>
+                </a:gridCol>
+                <a:gridCol w="955254">
+                  <a:extLst>
+                    <a:ext uri="{9D8B030D-6E8A-4147-A177-3AD203B41FA5}">
+                      <a16:colId xmlns:a16="http://schemas.microsoft.com/office/drawing/2014/main" val="3720598105"/>
+                    </a:ext>
+                  </a:extLst>
+                </a:gridCol>
+              </a:tblGrid>
+              <a:tr h="360253">
+                <a:tc>
+                  <a:txBody>
+                    <a:bodyPr/>
+                    <a:lstStyle/>
+                    <a:p>
+                      <a:endParaRPr lang="it-IT" dirty="0"/>
+                    </a:p>
+                  </a:txBody>
+                  <a:tcPr/>
+                </a:tc>
+                <a:tc>
+                  <a:txBody>
+                    <a:bodyPr/>
+                    <a:lstStyle/>
+                    <a:p>
+                      <a:r>
+                        <a:rPr lang="it-IT" dirty="0"/>
+                        <a:t>Feature</a:t>
+                      </a:r>
+                    </a:p>
+                  </a:txBody>
+                  <a:tcPr/>
+                </a:tc>
+                <a:tc>
+                  <a:txBody>
+                    <a:bodyPr/>
+                    <a:lstStyle/>
+                    <a:p>
+                      <a:r>
+                        <a:rPr lang="it-IT" dirty="0"/>
+                        <a:t>Valori</a:t>
+                      </a:r>
+                    </a:p>
+                  </a:txBody>
+                  <a:tcPr/>
+                </a:tc>
+                <a:extLst>
+                  <a:ext uri="{0D108BD9-81ED-4DB2-BD59-A6C34878D82A}">
+                    <a16:rowId xmlns:a16="http://schemas.microsoft.com/office/drawing/2014/main" val="1284576374"/>
+                  </a:ext>
+                </a:extLst>
+              </a:tr>
+              <a:tr h="360017">
+                <a:tc>
+                  <a:txBody>
+                    <a:bodyPr/>
+                    <a:lstStyle/>
+                    <a:p>
+                      <a:r>
+                        <a:rPr lang="it-IT" sz="1200" dirty="0"/>
+                        <a:t>0</a:t>
+                      </a:r>
+                    </a:p>
+                  </a:txBody>
+                  <a:tcPr/>
+                </a:tc>
+                <a:tc>
+                  <a:txBody>
+                    <a:bodyPr/>
+                    <a:lstStyle/>
+                    <a:p>
+                      <a:r>
+                        <a:rPr lang="it-IT" sz="1200" dirty="0" err="1"/>
+                        <a:t>having_IP_Address</a:t>
+                      </a:r>
+                      <a:endParaRPr lang="it-IT" sz="1200" dirty="0"/>
+                    </a:p>
+                  </a:txBody>
+                  <a:tcPr/>
+                </a:tc>
+                <a:tc>
+                  <a:txBody>
+                    <a:bodyPr/>
+                    <a:lstStyle/>
+                    <a:p>
+                      <a:r>
+                        <a:rPr lang="it-IT" sz="1200" dirty="0"/>
+                        <a:t>-1,1</a:t>
+                      </a:r>
+                    </a:p>
+                  </a:txBody>
+                  <a:tcPr/>
+                </a:tc>
+                <a:extLst>
+                  <a:ext uri="{0D108BD9-81ED-4DB2-BD59-A6C34878D82A}">
+                    <a16:rowId xmlns:a16="http://schemas.microsoft.com/office/drawing/2014/main" val="1647846680"/>
+                  </a:ext>
+                </a:extLst>
+              </a:tr>
+              <a:tr h="360017">
+                <a:tc>
+                  <a:txBody>
+                    <a:bodyPr/>
+                    <a:lstStyle/>
+                    <a:p>
+                      <a:r>
+                        <a:rPr lang="it-IT" sz="1200" dirty="0"/>
+                        <a:t>1</a:t>
+                      </a:r>
+                    </a:p>
+                  </a:txBody>
+                  <a:tcPr/>
+                </a:tc>
+                <a:tc>
+                  <a:txBody>
+                    <a:bodyPr/>
+                    <a:lstStyle/>
+                    <a:p>
+                      <a:r>
+                        <a:rPr lang="it-IT" sz="1200" dirty="0" err="1"/>
+                        <a:t>URL_Length</a:t>
+                      </a:r>
+                      <a:r>
+                        <a:rPr lang="it-IT" sz="1200" dirty="0"/>
+                        <a:t> </a:t>
+                      </a:r>
+                    </a:p>
+                  </a:txBody>
+                  <a:tcPr/>
+                </a:tc>
+                <a:tc>
+                  <a:txBody>
+                    <a:bodyPr/>
+                    <a:lstStyle/>
+                    <a:p>
+                      <a:r>
+                        <a:rPr lang="it-IT" sz="1200" dirty="0"/>
+                        <a:t>-1,0,1</a:t>
+                      </a:r>
+                    </a:p>
+                  </a:txBody>
+                  <a:tcPr/>
+                </a:tc>
+                <a:extLst>
+                  <a:ext uri="{0D108BD9-81ED-4DB2-BD59-A6C34878D82A}">
+                    <a16:rowId xmlns:a16="http://schemas.microsoft.com/office/drawing/2014/main" val="3300793905"/>
+                  </a:ext>
+                </a:extLst>
+              </a:tr>
+              <a:tr h="360017">
+                <a:tc>
+                  <a:txBody>
+                    <a:bodyPr/>
+                    <a:lstStyle/>
+                    <a:p>
+                      <a:r>
+                        <a:rPr lang="it-IT" sz="1200" dirty="0"/>
+                        <a:t>2</a:t>
+                      </a:r>
+                    </a:p>
+                  </a:txBody>
+                  <a:tcPr/>
+                </a:tc>
+                <a:tc>
+                  <a:txBody>
+                    <a:bodyPr/>
+                    <a:lstStyle/>
+                    <a:p>
+                      <a:r>
+                        <a:rPr lang="it-IT" sz="1200" dirty="0" err="1"/>
+                        <a:t>Shortining_Service</a:t>
+                      </a:r>
+                      <a:endParaRPr lang="it-IT" sz="1200" dirty="0"/>
+                    </a:p>
+                  </a:txBody>
+                  <a:tcPr/>
+                </a:tc>
+                <a:tc>
+                  <a:txBody>
+                    <a:bodyPr/>
+                    <a:lstStyle/>
+                    <a:p>
+                      <a:r>
+                        <a:rPr lang="it-IT" sz="1200" dirty="0"/>
+                        <a:t>-1,1</a:t>
+                      </a:r>
+                    </a:p>
+                  </a:txBody>
+                  <a:tcPr/>
+                </a:tc>
+                <a:extLst>
+                  <a:ext uri="{0D108BD9-81ED-4DB2-BD59-A6C34878D82A}">
+                    <a16:rowId xmlns:a16="http://schemas.microsoft.com/office/drawing/2014/main" val="2745136598"/>
+                  </a:ext>
+                </a:extLst>
+              </a:tr>
+              <a:tr h="360017">
+                <a:tc>
+                  <a:txBody>
+                    <a:bodyPr/>
+                    <a:lstStyle/>
+                    <a:p>
+                      <a:r>
+                        <a:rPr lang="it-IT" sz="1200" dirty="0"/>
+                        <a:t>3</a:t>
+                      </a:r>
+                    </a:p>
+                  </a:txBody>
+                  <a:tcPr/>
+                </a:tc>
+                <a:tc>
+                  <a:txBody>
+                    <a:bodyPr/>
+                    <a:lstStyle/>
+                    <a:p>
+                      <a:r>
+                        <a:rPr lang="it-IT" sz="1200" dirty="0" err="1"/>
+                        <a:t>having_At_Symbol</a:t>
+                      </a:r>
+                      <a:endParaRPr lang="it-IT" sz="1200" dirty="0"/>
+                    </a:p>
+                  </a:txBody>
+                  <a:tcPr/>
+                </a:tc>
+                <a:tc>
+                  <a:txBody>
+                    <a:bodyPr/>
+                    <a:lstStyle/>
+                    <a:p>
+                      <a:r>
+                        <a:rPr lang="it-IT" sz="1200" dirty="0"/>
+                        <a:t>-1,1</a:t>
+                      </a:r>
+                    </a:p>
+                  </a:txBody>
+                  <a:tcPr/>
+                </a:tc>
+                <a:extLst>
+                  <a:ext uri="{0D108BD9-81ED-4DB2-BD59-A6C34878D82A}">
+                    <a16:rowId xmlns:a16="http://schemas.microsoft.com/office/drawing/2014/main" val="3720216906"/>
+                  </a:ext>
+                </a:extLst>
+              </a:tr>
+              <a:tr h="450316">
+                <a:tc>
+                  <a:txBody>
+                    <a:bodyPr/>
+                    <a:lstStyle/>
+                    <a:p>
+                      <a:r>
+                        <a:rPr lang="it-IT" sz="1200" dirty="0"/>
+                        <a:t>4</a:t>
+                      </a:r>
+                    </a:p>
+                  </a:txBody>
+                  <a:tcPr/>
+                </a:tc>
+                <a:tc>
+                  <a:txBody>
+                    <a:bodyPr/>
+                    <a:lstStyle/>
+                    <a:p>
+                      <a:r>
+                        <a:rPr lang="it-IT" sz="1200" dirty="0" err="1"/>
+                        <a:t>double_slash_redirecting</a:t>
+                      </a:r>
+                      <a:endParaRPr lang="it-IT" sz="1200" dirty="0"/>
+                    </a:p>
+                  </a:txBody>
+                  <a:tcPr/>
+                </a:tc>
+                <a:tc>
+                  <a:txBody>
+                    <a:bodyPr/>
+                    <a:lstStyle/>
+                    <a:p>
+                      <a:pPr marL="0" marR="0" lvl="0" indent="0" algn="l" defTabSz="914400" rtl="0" eaLnBrk="1" fontAlgn="auto" latinLnBrk="0" hangingPunct="1">
+                        <a:lnSpc>
+                          <a:spcPct val="100000"/>
+                        </a:lnSpc>
+                        <a:spcBef>
+                          <a:spcPts val="0"/>
+                        </a:spcBef>
+                        <a:spcAft>
+                          <a:spcPts val="0"/>
+                        </a:spcAft>
+                        <a:buClrTx/>
+                        <a:buSzTx/>
+                        <a:buFontTx/>
+                        <a:buNone/>
+                        <a:tabLst/>
+                        <a:defRPr/>
+                      </a:pPr>
+                      <a:r>
+                        <a:rPr lang="it-IT" sz="1200" dirty="0"/>
+                        <a:t>-1,1</a:t>
+                      </a:r>
+                    </a:p>
+                    <a:p>
+                      <a:endParaRPr lang="it-IT" sz="1200" dirty="0"/>
+                    </a:p>
+                  </a:txBody>
+                  <a:tcPr/>
+                </a:tc>
+                <a:extLst>
+                  <a:ext uri="{0D108BD9-81ED-4DB2-BD59-A6C34878D82A}">
+                    <a16:rowId xmlns:a16="http://schemas.microsoft.com/office/drawing/2014/main" val="913506369"/>
+                  </a:ext>
+                </a:extLst>
+              </a:tr>
+              <a:tr h="360017">
+                <a:tc>
+                  <a:txBody>
+                    <a:bodyPr/>
+                    <a:lstStyle/>
+                    <a:p>
+                      <a:r>
+                        <a:rPr lang="it-IT" sz="1200" dirty="0"/>
+                        <a:t>5</a:t>
+                      </a:r>
+                    </a:p>
+                  </a:txBody>
+                  <a:tcPr/>
+                </a:tc>
+                <a:tc>
+                  <a:txBody>
+                    <a:bodyPr/>
+                    <a:lstStyle/>
+                    <a:p>
+                      <a:r>
+                        <a:rPr lang="it-IT" sz="1200" dirty="0" err="1"/>
+                        <a:t>Prefix_Suffix</a:t>
+                      </a:r>
+                      <a:endParaRPr lang="it-IT" sz="1200" dirty="0"/>
+                    </a:p>
+                  </a:txBody>
+                  <a:tcPr/>
+                </a:tc>
+                <a:tc>
+                  <a:txBody>
+                    <a:bodyPr/>
+                    <a:lstStyle/>
+                    <a:p>
+                      <a:pPr marL="0" marR="0" lvl="0" indent="0" algn="l" defTabSz="914400" rtl="0" eaLnBrk="1" fontAlgn="auto" latinLnBrk="0" hangingPunct="1">
+                        <a:lnSpc>
+                          <a:spcPct val="100000"/>
+                        </a:lnSpc>
+                        <a:spcBef>
+                          <a:spcPts val="0"/>
+                        </a:spcBef>
+                        <a:spcAft>
+                          <a:spcPts val="0"/>
+                        </a:spcAft>
+                        <a:buClrTx/>
+                        <a:buSzTx/>
+                        <a:buFontTx/>
+                        <a:buNone/>
+                        <a:tabLst/>
+                        <a:defRPr/>
+                      </a:pPr>
+                      <a:r>
+                        <a:rPr lang="it-IT" sz="1200" dirty="0"/>
+                        <a:t>-1,1</a:t>
+                      </a:r>
+                    </a:p>
+                  </a:txBody>
+                  <a:tcPr/>
+                </a:tc>
+                <a:extLst>
+                  <a:ext uri="{0D108BD9-81ED-4DB2-BD59-A6C34878D82A}">
+                    <a16:rowId xmlns:a16="http://schemas.microsoft.com/office/drawing/2014/main" val="2574793778"/>
+                  </a:ext>
+                </a:extLst>
+              </a:tr>
+              <a:tr h="360017">
+                <a:tc>
+                  <a:txBody>
+                    <a:bodyPr/>
+                    <a:lstStyle/>
+                    <a:p>
+                      <a:r>
+                        <a:rPr lang="it-IT" sz="1200" dirty="0"/>
+                        <a:t>6</a:t>
+                      </a:r>
+                    </a:p>
+                  </a:txBody>
+                  <a:tcPr/>
+                </a:tc>
+                <a:tc>
+                  <a:txBody>
+                    <a:bodyPr/>
+                    <a:lstStyle/>
+                    <a:p>
+                      <a:r>
+                        <a:rPr lang="it-IT" sz="1200" dirty="0" err="1"/>
+                        <a:t>having_Sub_Domain</a:t>
+                      </a:r>
+                      <a:endParaRPr lang="it-IT" sz="1200" dirty="0"/>
+                    </a:p>
+                  </a:txBody>
+                  <a:tcPr/>
+                </a:tc>
+                <a:tc>
+                  <a:txBody>
+                    <a:bodyPr/>
+                    <a:lstStyle/>
+                    <a:p>
+                      <a:r>
+                        <a:rPr lang="it-IT" sz="1200" dirty="0"/>
+                        <a:t>-1,0,1</a:t>
+                      </a:r>
+                    </a:p>
+                  </a:txBody>
+                  <a:tcPr/>
+                </a:tc>
+                <a:extLst>
+                  <a:ext uri="{0D108BD9-81ED-4DB2-BD59-A6C34878D82A}">
+                    <a16:rowId xmlns:a16="http://schemas.microsoft.com/office/drawing/2014/main" val="339849560"/>
+                  </a:ext>
+                </a:extLst>
+              </a:tr>
+              <a:tr h="360017">
+                <a:tc>
+                  <a:txBody>
+                    <a:bodyPr/>
+                    <a:lstStyle/>
+                    <a:p>
+                      <a:r>
+                        <a:rPr lang="it-IT" sz="1200" dirty="0"/>
+                        <a:t>7</a:t>
+                      </a:r>
+                    </a:p>
+                  </a:txBody>
+                  <a:tcPr/>
+                </a:tc>
+                <a:tc>
+                  <a:txBody>
+                    <a:bodyPr/>
+                    <a:lstStyle/>
+                    <a:p>
+                      <a:r>
+                        <a:rPr lang="it-IT" sz="1200" dirty="0" err="1"/>
+                        <a:t>SSLfinal_State</a:t>
+                      </a:r>
+                      <a:r>
+                        <a:rPr lang="it-IT" sz="1200" dirty="0"/>
+                        <a:t> </a:t>
+                      </a:r>
+                    </a:p>
+                  </a:txBody>
+                  <a:tcPr/>
+                </a:tc>
+                <a:tc>
+                  <a:txBody>
+                    <a:bodyPr/>
+                    <a:lstStyle/>
+                    <a:p>
+                      <a:r>
+                        <a:rPr lang="it-IT" sz="1200" dirty="0"/>
+                        <a:t>-1,0,1</a:t>
+                      </a:r>
+                    </a:p>
+                  </a:txBody>
+                  <a:tcPr/>
+                </a:tc>
+                <a:extLst>
+                  <a:ext uri="{0D108BD9-81ED-4DB2-BD59-A6C34878D82A}">
+                    <a16:rowId xmlns:a16="http://schemas.microsoft.com/office/drawing/2014/main" val="90323139"/>
+                  </a:ext>
+                </a:extLst>
+              </a:tr>
+              <a:tr h="360017">
+                <a:tc>
+                  <a:txBody>
+                    <a:bodyPr/>
+                    <a:lstStyle/>
+                    <a:p>
+                      <a:r>
+                        <a:rPr lang="it-IT" sz="1200" dirty="0"/>
+                        <a:t>8</a:t>
+                      </a:r>
+                    </a:p>
+                  </a:txBody>
+                  <a:tcPr/>
+                </a:tc>
+                <a:tc>
+                  <a:txBody>
+                    <a:bodyPr/>
+                    <a:lstStyle/>
+                    <a:p>
+                      <a:r>
+                        <a:rPr lang="it-IT" sz="1200" dirty="0" err="1"/>
+                        <a:t>Domain_registeration_length</a:t>
+                      </a:r>
+                      <a:endParaRPr lang="it-IT" sz="1200" dirty="0"/>
+                    </a:p>
+                  </a:txBody>
+                  <a:tcPr/>
+                </a:tc>
+                <a:tc>
+                  <a:txBody>
+                    <a:bodyPr/>
+                    <a:lstStyle/>
+                    <a:p>
+                      <a:r>
+                        <a:rPr lang="it-IT" sz="1200" dirty="0"/>
+                        <a:t>-1,1</a:t>
+                      </a:r>
+                    </a:p>
+                  </a:txBody>
+                  <a:tcPr/>
+                </a:tc>
+                <a:extLst>
+                  <a:ext uri="{0D108BD9-81ED-4DB2-BD59-A6C34878D82A}">
+                    <a16:rowId xmlns:a16="http://schemas.microsoft.com/office/drawing/2014/main" val="641185108"/>
+                  </a:ext>
+                </a:extLst>
+              </a:tr>
+              <a:tr h="360017">
+                <a:tc>
+                  <a:txBody>
+                    <a:bodyPr/>
+                    <a:lstStyle/>
+                    <a:p>
+                      <a:r>
+                        <a:rPr lang="it-IT" sz="1200" dirty="0"/>
+                        <a:t>9</a:t>
+                      </a:r>
+                    </a:p>
+                  </a:txBody>
+                  <a:tcPr/>
+                </a:tc>
+                <a:tc>
+                  <a:txBody>
+                    <a:bodyPr/>
+                    <a:lstStyle/>
+                    <a:p>
+                      <a:r>
+                        <a:rPr lang="it-IT" sz="1200" dirty="0" err="1"/>
+                        <a:t>Favicon</a:t>
+                      </a:r>
+                      <a:endParaRPr lang="it-IT" sz="1200" dirty="0"/>
+                    </a:p>
+                  </a:txBody>
+                  <a:tcPr/>
+                </a:tc>
+                <a:tc>
+                  <a:txBody>
+                    <a:bodyPr/>
+                    <a:lstStyle/>
+                    <a:p>
+                      <a:r>
+                        <a:rPr lang="it-IT" sz="1200" dirty="0"/>
+                        <a:t>-1,1</a:t>
+                      </a:r>
+                    </a:p>
+                  </a:txBody>
+                  <a:tcPr/>
+                </a:tc>
+                <a:extLst>
+                  <a:ext uri="{0D108BD9-81ED-4DB2-BD59-A6C34878D82A}">
+                    <a16:rowId xmlns:a16="http://schemas.microsoft.com/office/drawing/2014/main" val="2952364307"/>
+                  </a:ext>
+                </a:extLst>
+              </a:tr>
+              <a:tr h="360017">
+                <a:tc>
+                  <a:txBody>
+                    <a:bodyPr/>
+                    <a:lstStyle/>
+                    <a:p>
+                      <a:r>
+                        <a:rPr lang="it-IT" sz="1200" dirty="0"/>
+                        <a:t>10</a:t>
+                      </a:r>
+                    </a:p>
+                  </a:txBody>
+                  <a:tcPr/>
+                </a:tc>
+                <a:tc>
+                  <a:txBody>
+                    <a:bodyPr/>
+                    <a:lstStyle/>
+                    <a:p>
+                      <a:r>
+                        <a:rPr lang="it-IT" sz="1200" dirty="0"/>
+                        <a:t>Port</a:t>
+                      </a:r>
+                    </a:p>
+                  </a:txBody>
+                  <a:tcPr/>
+                </a:tc>
+                <a:tc>
+                  <a:txBody>
+                    <a:bodyPr/>
+                    <a:lstStyle/>
+                    <a:p>
+                      <a:r>
+                        <a:rPr lang="it-IT" sz="1200" dirty="0"/>
+                        <a:t>-1,1</a:t>
+                      </a:r>
+                    </a:p>
+                  </a:txBody>
+                  <a:tcPr/>
+                </a:tc>
+                <a:extLst>
+                  <a:ext uri="{0D108BD9-81ED-4DB2-BD59-A6C34878D82A}">
+                    <a16:rowId xmlns:a16="http://schemas.microsoft.com/office/drawing/2014/main" val="1711059247"/>
+                  </a:ext>
+                </a:extLst>
+              </a:tr>
+              <a:tr h="360017">
+                <a:tc>
+                  <a:txBody>
+                    <a:bodyPr/>
+                    <a:lstStyle/>
+                    <a:p>
+                      <a:r>
+                        <a:rPr lang="it-IT" sz="1200" dirty="0"/>
+                        <a:t>11</a:t>
+                      </a:r>
+                    </a:p>
+                  </a:txBody>
+                  <a:tcPr/>
+                </a:tc>
+                <a:tc>
+                  <a:txBody>
+                    <a:bodyPr/>
+                    <a:lstStyle/>
+                    <a:p>
+                      <a:r>
+                        <a:rPr lang="it-IT" sz="1200" dirty="0" err="1"/>
+                        <a:t>HTTPS_token</a:t>
+                      </a:r>
+                      <a:endParaRPr lang="it-IT" sz="1200" dirty="0"/>
+                    </a:p>
+                  </a:txBody>
+                  <a:tcPr/>
+                </a:tc>
+                <a:tc>
+                  <a:txBody>
+                    <a:bodyPr/>
+                    <a:lstStyle/>
+                    <a:p>
+                      <a:r>
+                        <a:rPr lang="it-IT" sz="1200" dirty="0"/>
+                        <a:t>-1,1</a:t>
+                      </a:r>
+                    </a:p>
+                  </a:txBody>
+                  <a:tcPr/>
+                </a:tc>
+                <a:extLst>
+                  <a:ext uri="{0D108BD9-81ED-4DB2-BD59-A6C34878D82A}">
+                    <a16:rowId xmlns:a16="http://schemas.microsoft.com/office/drawing/2014/main" val="73387310"/>
+                  </a:ext>
+                </a:extLst>
+              </a:tr>
+              <a:tr h="360017">
+                <a:tc>
+                  <a:txBody>
+                    <a:bodyPr/>
+                    <a:lstStyle/>
+                    <a:p>
+                      <a:r>
+                        <a:rPr lang="it-IT" sz="1200" dirty="0"/>
+                        <a:t>12</a:t>
+                      </a:r>
+                    </a:p>
+                  </a:txBody>
+                  <a:tcPr/>
+                </a:tc>
+                <a:tc>
+                  <a:txBody>
+                    <a:bodyPr/>
+                    <a:lstStyle/>
+                    <a:p>
+                      <a:r>
+                        <a:rPr lang="it-IT" sz="1200" dirty="0" err="1"/>
+                        <a:t>Request_URL</a:t>
+                      </a:r>
+                      <a:endParaRPr lang="it-IT" sz="1200" dirty="0"/>
+                    </a:p>
+                  </a:txBody>
+                  <a:tcPr/>
+                </a:tc>
+                <a:tc>
+                  <a:txBody>
+                    <a:bodyPr/>
+                    <a:lstStyle/>
+                    <a:p>
+                      <a:r>
+                        <a:rPr lang="it-IT" sz="1200" dirty="0"/>
+                        <a:t>-1,1</a:t>
+                      </a:r>
+                    </a:p>
+                  </a:txBody>
+                  <a:tcPr/>
+                </a:tc>
+                <a:extLst>
+                  <a:ext uri="{0D108BD9-81ED-4DB2-BD59-A6C34878D82A}">
+                    <a16:rowId xmlns:a16="http://schemas.microsoft.com/office/drawing/2014/main" val="288806971"/>
+                  </a:ext>
+                </a:extLst>
+              </a:tr>
+              <a:tr h="360017">
+                <a:tc>
+                  <a:txBody>
+                    <a:bodyPr/>
+                    <a:lstStyle/>
+                    <a:p>
+                      <a:r>
+                        <a:rPr lang="it-IT" sz="1200" dirty="0"/>
+                        <a:t>13</a:t>
+                      </a:r>
+                    </a:p>
+                  </a:txBody>
+                  <a:tcPr/>
+                </a:tc>
+                <a:tc>
+                  <a:txBody>
+                    <a:bodyPr/>
+                    <a:lstStyle/>
+                    <a:p>
+                      <a:r>
+                        <a:rPr lang="it-IT" sz="1200" dirty="0" err="1"/>
+                        <a:t>URL_of_Anchor</a:t>
+                      </a:r>
+                      <a:endParaRPr lang="it-IT" sz="1200" dirty="0"/>
+                    </a:p>
+                  </a:txBody>
+                  <a:tcPr/>
+                </a:tc>
+                <a:tc>
+                  <a:txBody>
+                    <a:bodyPr/>
+                    <a:lstStyle/>
+                    <a:p>
+                      <a:r>
+                        <a:rPr lang="it-IT" sz="1200" dirty="0"/>
+                        <a:t>-1,0,1</a:t>
+                      </a:r>
+                    </a:p>
+                  </a:txBody>
+                  <a:tcPr/>
+                </a:tc>
+                <a:extLst>
+                  <a:ext uri="{0D108BD9-81ED-4DB2-BD59-A6C34878D82A}">
+                    <a16:rowId xmlns:a16="http://schemas.microsoft.com/office/drawing/2014/main" val="109605842"/>
+                  </a:ext>
+                </a:extLst>
+              </a:tr>
+              <a:tr h="360017">
+                <a:tc>
+                  <a:txBody>
+                    <a:bodyPr/>
+                    <a:lstStyle/>
+                    <a:p>
+                      <a:r>
+                        <a:rPr lang="it-IT" sz="1200" dirty="0"/>
+                        <a:t>14</a:t>
+                      </a:r>
+                    </a:p>
+                  </a:txBody>
+                  <a:tcPr/>
+                </a:tc>
+                <a:tc>
+                  <a:txBody>
+                    <a:bodyPr/>
+                    <a:lstStyle/>
+                    <a:p>
+                      <a:r>
+                        <a:rPr lang="it-IT" sz="1200" dirty="0" err="1"/>
+                        <a:t>Links_in_tags</a:t>
+                      </a:r>
+                      <a:endParaRPr lang="it-IT" sz="1200" dirty="0"/>
+                    </a:p>
+                  </a:txBody>
+                  <a:tcPr/>
+                </a:tc>
+                <a:tc>
+                  <a:txBody>
+                    <a:bodyPr/>
+                    <a:lstStyle/>
+                    <a:p>
+                      <a:r>
+                        <a:rPr lang="it-IT" sz="1200" dirty="0"/>
+                        <a:t>-1,0,1</a:t>
+                      </a:r>
+                    </a:p>
+                  </a:txBody>
+                  <a:tcPr/>
+                </a:tc>
+                <a:extLst>
+                  <a:ext uri="{0D108BD9-81ED-4DB2-BD59-A6C34878D82A}">
+                    <a16:rowId xmlns:a16="http://schemas.microsoft.com/office/drawing/2014/main" val="452143886"/>
+                  </a:ext>
+                </a:extLst>
+              </a:tr>
+            </a:tbl>
+          </a:graphicData>
+        </a:graphic>
+      </p:graphicFrame>
+      <p:graphicFrame>
+        <p:nvGraphicFramePr>
+          <p:cNvPr id="10" name="Segnaposto contenuto 6">
+            <a:extLst>
+              <a:ext uri="{FF2B5EF4-FFF2-40B4-BE49-F238E27FC236}">
+                <a16:creationId xmlns:a16="http://schemas.microsoft.com/office/drawing/2014/main" id="{0A989623-6EDA-4492-B4DB-E504268807AB}"/>
+              </a:ext>
+            </a:extLst>
+          </p:cNvPr>
+          <p:cNvGraphicFramePr>
+            <a:graphicFrameLocks/>
+          </p:cNvGraphicFramePr>
+          <p:nvPr>
+            <p:extLst>
+              <p:ext uri="{D42A27DB-BD31-4B8C-83A1-F6EECF244321}">
+                <p14:modId xmlns:p14="http://schemas.microsoft.com/office/powerpoint/2010/main" val="567233550"/>
+              </p:ext>
+            </p:extLst>
+          </p:nvPr>
+        </p:nvGraphicFramePr>
+        <p:xfrm>
+          <a:off x="7856538" y="643128"/>
+          <a:ext cx="3531448" cy="5933440"/>
+        </p:xfrm>
+        <a:graphic>
+          <a:graphicData uri="http://schemas.openxmlformats.org/drawingml/2006/table">
+            <a:tbl>
+              <a:tblPr firstRow="1" bandRow="1">
+                <a:tableStyleId>{5C22544A-7EE6-4342-B048-85BDC9FD1C3A}</a:tableStyleId>
+              </a:tblPr>
+              <a:tblGrid>
+                <a:gridCol w="449580">
+                  <a:extLst>
+                    <a:ext uri="{9D8B030D-6E8A-4147-A177-3AD203B41FA5}">
+                      <a16:colId xmlns:a16="http://schemas.microsoft.com/office/drawing/2014/main" val="1316119872"/>
+                    </a:ext>
+                  </a:extLst>
+                </a:gridCol>
+                <a:gridCol w="2023533">
+                  <a:extLst>
+                    <a:ext uri="{9D8B030D-6E8A-4147-A177-3AD203B41FA5}">
+                      <a16:colId xmlns:a16="http://schemas.microsoft.com/office/drawing/2014/main" val="428350377"/>
+                    </a:ext>
+                  </a:extLst>
+                </a:gridCol>
+                <a:gridCol w="1058335">
+                  <a:extLst>
+                    <a:ext uri="{9D8B030D-6E8A-4147-A177-3AD203B41FA5}">
+                      <a16:colId xmlns:a16="http://schemas.microsoft.com/office/drawing/2014/main" val="3720598105"/>
+                    </a:ext>
+                  </a:extLst>
+                </a:gridCol>
+              </a:tblGrid>
+              <a:tr h="370840">
+                <a:tc>
+                  <a:txBody>
+                    <a:bodyPr/>
+                    <a:lstStyle/>
+                    <a:p>
+                      <a:endParaRPr lang="it-IT" dirty="0"/>
+                    </a:p>
+                  </a:txBody>
+                  <a:tcPr/>
+                </a:tc>
+                <a:tc>
+                  <a:txBody>
+                    <a:bodyPr/>
+                    <a:lstStyle/>
+                    <a:p>
+                      <a:r>
+                        <a:rPr lang="it-IT" dirty="0"/>
+                        <a:t>Feature</a:t>
+                      </a:r>
+                    </a:p>
+                  </a:txBody>
+                  <a:tcPr/>
+                </a:tc>
+                <a:tc>
+                  <a:txBody>
+                    <a:bodyPr/>
+                    <a:lstStyle/>
+                    <a:p>
+                      <a:r>
+                        <a:rPr lang="it-IT" dirty="0"/>
+                        <a:t>Valori</a:t>
+                      </a:r>
+                    </a:p>
+                  </a:txBody>
+                  <a:tcPr/>
+                </a:tc>
+                <a:extLst>
+                  <a:ext uri="{0D108BD9-81ED-4DB2-BD59-A6C34878D82A}">
+                    <a16:rowId xmlns:a16="http://schemas.microsoft.com/office/drawing/2014/main" val="1284576374"/>
+                  </a:ext>
+                </a:extLst>
+              </a:tr>
+              <a:tr h="370840">
+                <a:tc>
+                  <a:txBody>
+                    <a:bodyPr/>
+                    <a:lstStyle/>
+                    <a:p>
+                      <a:r>
+                        <a:rPr lang="it-IT" sz="1200" dirty="0"/>
+                        <a:t>15</a:t>
+                      </a:r>
+                    </a:p>
+                  </a:txBody>
+                  <a:tcPr/>
+                </a:tc>
+                <a:tc>
+                  <a:txBody>
+                    <a:bodyPr/>
+                    <a:lstStyle/>
+                    <a:p>
+                      <a:r>
+                        <a:rPr lang="it-IT" sz="1200" dirty="0"/>
+                        <a:t>SFH</a:t>
+                      </a:r>
+                    </a:p>
+                  </a:txBody>
+                  <a:tcPr/>
+                </a:tc>
+                <a:tc>
+                  <a:txBody>
+                    <a:bodyPr/>
+                    <a:lstStyle/>
+                    <a:p>
+                      <a:r>
+                        <a:rPr lang="it-IT" sz="1200" dirty="0"/>
+                        <a:t>-1,0,1</a:t>
+                      </a:r>
+                    </a:p>
+                  </a:txBody>
+                  <a:tcPr/>
+                </a:tc>
+                <a:extLst>
+                  <a:ext uri="{0D108BD9-81ED-4DB2-BD59-A6C34878D82A}">
+                    <a16:rowId xmlns:a16="http://schemas.microsoft.com/office/drawing/2014/main" val="1128768703"/>
+                  </a:ext>
+                </a:extLst>
+              </a:tr>
+              <a:tr h="370840">
+                <a:tc>
+                  <a:txBody>
+                    <a:bodyPr/>
+                    <a:lstStyle/>
+                    <a:p>
+                      <a:r>
+                        <a:rPr lang="it-IT" sz="1200" dirty="0"/>
+                        <a:t>16</a:t>
+                      </a:r>
+                    </a:p>
+                  </a:txBody>
+                  <a:tcPr/>
+                </a:tc>
+                <a:tc>
+                  <a:txBody>
+                    <a:bodyPr/>
+                    <a:lstStyle/>
+                    <a:p>
+                      <a:r>
+                        <a:rPr lang="it-IT" sz="1200" dirty="0" err="1"/>
+                        <a:t>Submitting_to_email</a:t>
+                      </a:r>
+                      <a:endParaRPr lang="it-IT" sz="1200" dirty="0"/>
+                    </a:p>
+                  </a:txBody>
+                  <a:tcPr/>
+                </a:tc>
+                <a:tc>
+                  <a:txBody>
+                    <a:bodyPr/>
+                    <a:lstStyle/>
+                    <a:p>
+                      <a:r>
+                        <a:rPr lang="it-IT" sz="1200" dirty="0"/>
+                        <a:t>-1,1</a:t>
+                      </a:r>
+                    </a:p>
+                  </a:txBody>
+                  <a:tcPr/>
+                </a:tc>
+                <a:extLst>
+                  <a:ext uri="{0D108BD9-81ED-4DB2-BD59-A6C34878D82A}">
+                    <a16:rowId xmlns:a16="http://schemas.microsoft.com/office/drawing/2014/main" val="1647846680"/>
+                  </a:ext>
+                </a:extLst>
+              </a:tr>
+              <a:tr h="370840">
+                <a:tc>
+                  <a:txBody>
+                    <a:bodyPr/>
+                    <a:lstStyle/>
+                    <a:p>
+                      <a:r>
+                        <a:rPr lang="it-IT" sz="1200" dirty="0"/>
+                        <a:t>17</a:t>
+                      </a:r>
+                    </a:p>
+                  </a:txBody>
+                  <a:tcPr/>
+                </a:tc>
+                <a:tc>
+                  <a:txBody>
+                    <a:bodyPr/>
+                    <a:lstStyle/>
+                    <a:p>
+                      <a:r>
+                        <a:rPr lang="it-IT" sz="1200" dirty="0" err="1"/>
+                        <a:t>Abnormal_URL</a:t>
+                      </a:r>
+                      <a:endParaRPr lang="it-IT" sz="1200" dirty="0"/>
+                    </a:p>
+                  </a:txBody>
+                  <a:tcPr/>
+                </a:tc>
+                <a:tc>
+                  <a:txBody>
+                    <a:bodyPr/>
+                    <a:lstStyle/>
+                    <a:p>
+                      <a:r>
+                        <a:rPr lang="it-IT" sz="1200" dirty="0"/>
+                        <a:t>-1,1</a:t>
+                      </a:r>
+                    </a:p>
+                  </a:txBody>
+                  <a:tcPr/>
+                </a:tc>
+                <a:extLst>
+                  <a:ext uri="{0D108BD9-81ED-4DB2-BD59-A6C34878D82A}">
+                    <a16:rowId xmlns:a16="http://schemas.microsoft.com/office/drawing/2014/main" val="3300793905"/>
+                  </a:ext>
+                </a:extLst>
+              </a:tr>
+              <a:tr h="370840">
+                <a:tc>
+                  <a:txBody>
+                    <a:bodyPr/>
+                    <a:lstStyle/>
+                    <a:p>
+                      <a:r>
+                        <a:rPr lang="it-IT" sz="1200" dirty="0"/>
+                        <a:t>18</a:t>
+                      </a:r>
+                    </a:p>
+                  </a:txBody>
+                  <a:tcPr/>
+                </a:tc>
+                <a:tc>
+                  <a:txBody>
+                    <a:bodyPr/>
+                    <a:lstStyle/>
+                    <a:p>
+                      <a:r>
+                        <a:rPr lang="it-IT" sz="1200" dirty="0" err="1"/>
+                        <a:t>Redirect</a:t>
+                      </a:r>
+                      <a:endParaRPr lang="it-IT" sz="1200" dirty="0"/>
+                    </a:p>
+                  </a:txBody>
+                  <a:tcPr/>
+                </a:tc>
+                <a:tc>
+                  <a:txBody>
+                    <a:bodyPr/>
+                    <a:lstStyle/>
+                    <a:p>
+                      <a:r>
+                        <a:rPr lang="it-IT" sz="1200" dirty="0"/>
+                        <a:t>0,1</a:t>
+                      </a:r>
+                    </a:p>
+                  </a:txBody>
+                  <a:tcPr/>
+                </a:tc>
+                <a:extLst>
+                  <a:ext uri="{0D108BD9-81ED-4DB2-BD59-A6C34878D82A}">
+                    <a16:rowId xmlns:a16="http://schemas.microsoft.com/office/drawing/2014/main" val="2745136598"/>
+                  </a:ext>
+                </a:extLst>
+              </a:tr>
+              <a:tr h="370840">
+                <a:tc>
+                  <a:txBody>
+                    <a:bodyPr/>
+                    <a:lstStyle/>
+                    <a:p>
+                      <a:r>
+                        <a:rPr lang="it-IT" sz="1200" dirty="0"/>
+                        <a:t>19</a:t>
+                      </a:r>
+                    </a:p>
+                  </a:txBody>
+                  <a:tcPr/>
+                </a:tc>
+                <a:tc>
+                  <a:txBody>
+                    <a:bodyPr/>
+                    <a:lstStyle/>
+                    <a:p>
+                      <a:r>
+                        <a:rPr lang="it-IT" sz="1200" dirty="0" err="1"/>
+                        <a:t>on_mouseover</a:t>
+                      </a:r>
+                      <a:r>
+                        <a:rPr lang="it-IT" sz="1200" dirty="0"/>
+                        <a:t> </a:t>
+                      </a:r>
+                    </a:p>
+                  </a:txBody>
+                  <a:tcPr/>
+                </a:tc>
+                <a:tc>
+                  <a:txBody>
+                    <a:bodyPr/>
+                    <a:lstStyle/>
+                    <a:p>
+                      <a:r>
+                        <a:rPr lang="it-IT" sz="1200" dirty="0"/>
+                        <a:t>-1,1</a:t>
+                      </a:r>
+                    </a:p>
+                  </a:txBody>
+                  <a:tcPr/>
+                </a:tc>
+                <a:extLst>
+                  <a:ext uri="{0D108BD9-81ED-4DB2-BD59-A6C34878D82A}">
+                    <a16:rowId xmlns:a16="http://schemas.microsoft.com/office/drawing/2014/main" val="3720216906"/>
+                  </a:ext>
+                </a:extLst>
+              </a:tr>
+              <a:tr h="370840">
+                <a:tc>
+                  <a:txBody>
+                    <a:bodyPr/>
+                    <a:lstStyle/>
+                    <a:p>
+                      <a:r>
+                        <a:rPr lang="it-IT" sz="1200" dirty="0"/>
+                        <a:t>20</a:t>
+                      </a:r>
+                    </a:p>
+                  </a:txBody>
+                  <a:tcPr/>
+                </a:tc>
+                <a:tc>
+                  <a:txBody>
+                    <a:bodyPr/>
+                    <a:lstStyle/>
+                    <a:p>
+                      <a:r>
+                        <a:rPr lang="it-IT" sz="1200" dirty="0" err="1"/>
+                        <a:t>RightClick</a:t>
+                      </a:r>
+                      <a:endParaRPr lang="it-IT" sz="1200" dirty="0"/>
+                    </a:p>
+                  </a:txBody>
+                  <a:tcPr/>
+                </a:tc>
+                <a:tc>
+                  <a:txBody>
+                    <a:bodyPr/>
+                    <a:lstStyle/>
+                    <a:p>
+                      <a:r>
+                        <a:rPr lang="it-IT" sz="1200" dirty="0"/>
+                        <a:t>-1,1</a:t>
+                      </a:r>
+                    </a:p>
+                  </a:txBody>
+                  <a:tcPr/>
+                </a:tc>
+                <a:extLst>
+                  <a:ext uri="{0D108BD9-81ED-4DB2-BD59-A6C34878D82A}">
+                    <a16:rowId xmlns:a16="http://schemas.microsoft.com/office/drawing/2014/main" val="913506369"/>
+                  </a:ext>
+                </a:extLst>
+              </a:tr>
+              <a:tr h="370840">
+                <a:tc>
+                  <a:txBody>
+                    <a:bodyPr/>
+                    <a:lstStyle/>
+                    <a:p>
+                      <a:r>
+                        <a:rPr lang="it-IT" sz="1200" dirty="0"/>
+                        <a:t>21</a:t>
+                      </a:r>
+                    </a:p>
+                  </a:txBody>
+                  <a:tcPr/>
+                </a:tc>
+                <a:tc>
+                  <a:txBody>
+                    <a:bodyPr/>
+                    <a:lstStyle/>
+                    <a:p>
+                      <a:r>
+                        <a:rPr lang="it-IT" sz="1200" dirty="0" err="1"/>
+                        <a:t>popUpWindow</a:t>
+                      </a:r>
+                      <a:r>
+                        <a:rPr lang="it-IT" sz="1200" dirty="0"/>
+                        <a:t> </a:t>
+                      </a:r>
+                    </a:p>
+                  </a:txBody>
+                  <a:tcPr/>
+                </a:tc>
+                <a:tc>
+                  <a:txBody>
+                    <a:bodyPr/>
+                    <a:lstStyle/>
+                    <a:p>
+                      <a:r>
+                        <a:rPr lang="it-IT" sz="1200" dirty="0"/>
+                        <a:t>-1,1</a:t>
+                      </a:r>
+                    </a:p>
+                  </a:txBody>
+                  <a:tcPr/>
+                </a:tc>
+                <a:extLst>
+                  <a:ext uri="{0D108BD9-81ED-4DB2-BD59-A6C34878D82A}">
+                    <a16:rowId xmlns:a16="http://schemas.microsoft.com/office/drawing/2014/main" val="2574793778"/>
+                  </a:ext>
+                </a:extLst>
+              </a:tr>
+              <a:tr h="370840">
+                <a:tc>
+                  <a:txBody>
+                    <a:bodyPr/>
+                    <a:lstStyle/>
+                    <a:p>
+                      <a:r>
+                        <a:rPr lang="it-IT" sz="1200" dirty="0"/>
+                        <a:t>22</a:t>
+                      </a:r>
+                    </a:p>
+                  </a:txBody>
+                  <a:tcPr/>
+                </a:tc>
+                <a:tc>
+                  <a:txBody>
+                    <a:bodyPr/>
+                    <a:lstStyle/>
+                    <a:p>
+                      <a:r>
+                        <a:rPr lang="it-IT" sz="1200" dirty="0" err="1"/>
+                        <a:t>Iframe</a:t>
+                      </a:r>
+                      <a:r>
+                        <a:rPr lang="it-IT" sz="1200" dirty="0"/>
+                        <a:t> </a:t>
+                      </a:r>
+                    </a:p>
+                  </a:txBody>
+                  <a:tcPr/>
+                </a:tc>
+                <a:tc>
+                  <a:txBody>
+                    <a:bodyPr/>
+                    <a:lstStyle/>
+                    <a:p>
+                      <a:r>
+                        <a:rPr lang="it-IT" sz="1200" dirty="0"/>
+                        <a:t>-1,1</a:t>
+                      </a:r>
+                    </a:p>
+                  </a:txBody>
+                  <a:tcPr/>
+                </a:tc>
+                <a:extLst>
+                  <a:ext uri="{0D108BD9-81ED-4DB2-BD59-A6C34878D82A}">
+                    <a16:rowId xmlns:a16="http://schemas.microsoft.com/office/drawing/2014/main" val="339849560"/>
+                  </a:ext>
+                </a:extLst>
+              </a:tr>
+              <a:tr h="370840">
+                <a:tc>
+                  <a:txBody>
+                    <a:bodyPr/>
+                    <a:lstStyle/>
+                    <a:p>
+                      <a:r>
+                        <a:rPr lang="it-IT" sz="1200" dirty="0"/>
+                        <a:t>23</a:t>
+                      </a:r>
+                    </a:p>
+                  </a:txBody>
+                  <a:tcPr/>
+                </a:tc>
+                <a:tc>
+                  <a:txBody>
+                    <a:bodyPr/>
+                    <a:lstStyle/>
+                    <a:p>
+                      <a:r>
+                        <a:rPr lang="it-IT" sz="1200" dirty="0" err="1"/>
+                        <a:t>age_of_domain</a:t>
+                      </a:r>
+                      <a:r>
+                        <a:rPr lang="it-IT" sz="1200" dirty="0"/>
+                        <a:t> </a:t>
+                      </a:r>
+                    </a:p>
+                  </a:txBody>
+                  <a:tcPr/>
+                </a:tc>
+                <a:tc>
+                  <a:txBody>
+                    <a:bodyPr/>
+                    <a:lstStyle/>
+                    <a:p>
+                      <a:r>
+                        <a:rPr lang="it-IT" sz="1200" dirty="0"/>
+                        <a:t>-1,1</a:t>
+                      </a:r>
+                    </a:p>
+                  </a:txBody>
+                  <a:tcPr/>
+                </a:tc>
+                <a:extLst>
+                  <a:ext uri="{0D108BD9-81ED-4DB2-BD59-A6C34878D82A}">
+                    <a16:rowId xmlns:a16="http://schemas.microsoft.com/office/drawing/2014/main" val="90323139"/>
+                  </a:ext>
+                </a:extLst>
+              </a:tr>
+              <a:tr h="370840">
+                <a:tc>
+                  <a:txBody>
+                    <a:bodyPr/>
+                    <a:lstStyle/>
+                    <a:p>
+                      <a:r>
+                        <a:rPr lang="it-IT" sz="1200" dirty="0"/>
+                        <a:t>24</a:t>
+                      </a:r>
+                    </a:p>
+                  </a:txBody>
+                  <a:tcPr/>
+                </a:tc>
+                <a:tc>
+                  <a:txBody>
+                    <a:bodyPr/>
+                    <a:lstStyle/>
+                    <a:p>
+                      <a:r>
+                        <a:rPr lang="it-IT" sz="1200" dirty="0" err="1"/>
+                        <a:t>DNSRecord</a:t>
+                      </a:r>
+                      <a:r>
+                        <a:rPr lang="it-IT" sz="1200" dirty="0"/>
+                        <a:t> </a:t>
+                      </a:r>
+                    </a:p>
+                  </a:txBody>
+                  <a:tcPr/>
+                </a:tc>
+                <a:tc>
+                  <a:txBody>
+                    <a:bodyPr/>
+                    <a:lstStyle/>
+                    <a:p>
+                      <a:r>
+                        <a:rPr lang="it-IT" sz="1200" dirty="0"/>
+                        <a:t>-1,1</a:t>
+                      </a:r>
+                    </a:p>
+                  </a:txBody>
+                  <a:tcPr/>
+                </a:tc>
+                <a:extLst>
+                  <a:ext uri="{0D108BD9-81ED-4DB2-BD59-A6C34878D82A}">
+                    <a16:rowId xmlns:a16="http://schemas.microsoft.com/office/drawing/2014/main" val="641185108"/>
+                  </a:ext>
+                </a:extLst>
+              </a:tr>
+              <a:tr h="370840">
+                <a:tc>
+                  <a:txBody>
+                    <a:bodyPr/>
+                    <a:lstStyle/>
+                    <a:p>
+                      <a:r>
+                        <a:rPr lang="it-IT" sz="1200" dirty="0"/>
+                        <a:t>25</a:t>
+                      </a:r>
+                    </a:p>
+                  </a:txBody>
+                  <a:tcPr/>
+                </a:tc>
+                <a:tc>
+                  <a:txBody>
+                    <a:bodyPr/>
+                    <a:lstStyle/>
+                    <a:p>
+                      <a:r>
+                        <a:rPr lang="it-IT" sz="1200" dirty="0" err="1"/>
+                        <a:t>web_traffic</a:t>
+                      </a:r>
+                      <a:r>
+                        <a:rPr lang="it-IT" sz="1200" dirty="0"/>
+                        <a:t> </a:t>
+                      </a:r>
+                    </a:p>
+                  </a:txBody>
+                  <a:tcPr/>
+                </a:tc>
+                <a:tc>
+                  <a:txBody>
+                    <a:bodyPr/>
+                    <a:lstStyle/>
+                    <a:p>
+                      <a:r>
+                        <a:rPr lang="it-IT" sz="1200" dirty="0"/>
+                        <a:t>-1,0,1</a:t>
+                      </a:r>
+                    </a:p>
+                  </a:txBody>
+                  <a:tcPr/>
+                </a:tc>
+                <a:extLst>
+                  <a:ext uri="{0D108BD9-81ED-4DB2-BD59-A6C34878D82A}">
+                    <a16:rowId xmlns:a16="http://schemas.microsoft.com/office/drawing/2014/main" val="2952364307"/>
+                  </a:ext>
+                </a:extLst>
+              </a:tr>
+              <a:tr h="370840">
+                <a:tc>
+                  <a:txBody>
+                    <a:bodyPr/>
+                    <a:lstStyle/>
+                    <a:p>
+                      <a:r>
+                        <a:rPr lang="it-IT" sz="1200" dirty="0"/>
+                        <a:t>26</a:t>
+                      </a:r>
+                    </a:p>
+                  </a:txBody>
+                  <a:tcPr/>
+                </a:tc>
+                <a:tc>
+                  <a:txBody>
+                    <a:bodyPr/>
+                    <a:lstStyle/>
+                    <a:p>
+                      <a:r>
+                        <a:rPr lang="it-IT" sz="1200" dirty="0" err="1"/>
+                        <a:t>Page_Rank</a:t>
+                      </a:r>
+                      <a:r>
+                        <a:rPr lang="it-IT" sz="1200" dirty="0"/>
+                        <a:t> </a:t>
+                      </a:r>
+                    </a:p>
+                  </a:txBody>
+                  <a:tcPr/>
+                </a:tc>
+                <a:tc>
+                  <a:txBody>
+                    <a:bodyPr/>
+                    <a:lstStyle/>
+                    <a:p>
+                      <a:r>
+                        <a:rPr lang="it-IT" sz="1200" dirty="0"/>
+                        <a:t>-1,1</a:t>
+                      </a:r>
+                    </a:p>
+                  </a:txBody>
+                  <a:tcPr/>
+                </a:tc>
+                <a:extLst>
+                  <a:ext uri="{0D108BD9-81ED-4DB2-BD59-A6C34878D82A}">
+                    <a16:rowId xmlns:a16="http://schemas.microsoft.com/office/drawing/2014/main" val="1711059247"/>
+                  </a:ext>
+                </a:extLst>
+              </a:tr>
+              <a:tr h="370840">
+                <a:tc>
+                  <a:txBody>
+                    <a:bodyPr/>
+                    <a:lstStyle/>
+                    <a:p>
+                      <a:r>
+                        <a:rPr lang="it-IT" sz="1200" dirty="0"/>
+                        <a:t>27</a:t>
+                      </a:r>
+                    </a:p>
+                  </a:txBody>
+                  <a:tcPr/>
+                </a:tc>
+                <a:tc>
+                  <a:txBody>
+                    <a:bodyPr/>
+                    <a:lstStyle/>
+                    <a:p>
+                      <a:r>
+                        <a:rPr lang="it-IT" sz="1200" dirty="0" err="1"/>
+                        <a:t>Google_Index</a:t>
+                      </a:r>
+                      <a:r>
+                        <a:rPr lang="it-IT" sz="1200" dirty="0"/>
+                        <a:t> </a:t>
+                      </a:r>
+                    </a:p>
+                  </a:txBody>
+                  <a:tcPr/>
+                </a:tc>
+                <a:tc>
+                  <a:txBody>
+                    <a:bodyPr/>
+                    <a:lstStyle/>
+                    <a:p>
+                      <a:r>
+                        <a:rPr lang="it-IT" sz="1200" dirty="0"/>
+                        <a:t>-1,1</a:t>
+                      </a:r>
+                    </a:p>
+                  </a:txBody>
+                  <a:tcPr/>
+                </a:tc>
+                <a:extLst>
+                  <a:ext uri="{0D108BD9-81ED-4DB2-BD59-A6C34878D82A}">
+                    <a16:rowId xmlns:a16="http://schemas.microsoft.com/office/drawing/2014/main" val="73387310"/>
+                  </a:ext>
+                </a:extLst>
+              </a:tr>
+              <a:tr h="370840">
+                <a:tc>
+                  <a:txBody>
+                    <a:bodyPr/>
+                    <a:lstStyle/>
+                    <a:p>
+                      <a:r>
+                        <a:rPr lang="it-IT" sz="1200" dirty="0"/>
+                        <a:t>28</a:t>
+                      </a:r>
+                    </a:p>
+                  </a:txBody>
+                  <a:tcPr/>
+                </a:tc>
+                <a:tc>
+                  <a:txBody>
+                    <a:bodyPr/>
+                    <a:lstStyle/>
+                    <a:p>
+                      <a:r>
+                        <a:rPr lang="it-IT" sz="1200" dirty="0" err="1"/>
+                        <a:t>Links_pointing_to_page</a:t>
+                      </a:r>
+                      <a:r>
+                        <a:rPr lang="it-IT" sz="1200" dirty="0"/>
+                        <a:t> </a:t>
+                      </a:r>
+                    </a:p>
+                  </a:txBody>
+                  <a:tcPr/>
+                </a:tc>
+                <a:tc>
+                  <a:txBody>
+                    <a:bodyPr/>
+                    <a:lstStyle/>
+                    <a:p>
+                      <a:r>
+                        <a:rPr lang="it-IT" sz="1200" dirty="0"/>
+                        <a:t>-1,0,1</a:t>
+                      </a:r>
+                    </a:p>
+                  </a:txBody>
+                  <a:tcPr/>
+                </a:tc>
+                <a:extLst>
+                  <a:ext uri="{0D108BD9-81ED-4DB2-BD59-A6C34878D82A}">
+                    <a16:rowId xmlns:a16="http://schemas.microsoft.com/office/drawing/2014/main" val="288806971"/>
+                  </a:ext>
+                </a:extLst>
+              </a:tr>
+              <a:tr h="370840">
+                <a:tc>
+                  <a:txBody>
+                    <a:bodyPr/>
+                    <a:lstStyle/>
+                    <a:p>
+                      <a:r>
+                        <a:rPr lang="it-IT" sz="1200" dirty="0"/>
+                        <a:t>29</a:t>
+                      </a:r>
+                    </a:p>
+                  </a:txBody>
+                  <a:tcPr/>
+                </a:tc>
+                <a:tc>
+                  <a:txBody>
+                    <a:bodyPr/>
+                    <a:lstStyle/>
+                    <a:p>
+                      <a:r>
+                        <a:rPr lang="it-IT" sz="1200" dirty="0" err="1"/>
+                        <a:t>Statistical_report</a:t>
+                      </a:r>
+                      <a:r>
+                        <a:rPr lang="it-IT" sz="1200" dirty="0"/>
+                        <a:t> </a:t>
+                      </a:r>
+                    </a:p>
+                  </a:txBody>
+                  <a:tcPr/>
+                </a:tc>
+                <a:tc>
+                  <a:txBody>
+                    <a:bodyPr/>
+                    <a:lstStyle/>
+                    <a:p>
+                      <a:r>
+                        <a:rPr lang="it-IT" sz="1200" dirty="0"/>
+                        <a:t>-1,1</a:t>
+                      </a:r>
+                    </a:p>
+                  </a:txBody>
+                  <a:tcPr/>
+                </a:tc>
+                <a:extLst>
+                  <a:ext uri="{0D108BD9-81ED-4DB2-BD59-A6C34878D82A}">
+                    <a16:rowId xmlns:a16="http://schemas.microsoft.com/office/drawing/2014/main" val="109605842"/>
+                  </a:ext>
+                </a:extLst>
+              </a:tr>
+            </a:tbl>
+          </a:graphicData>
+        </a:graphic>
+      </p:graphicFrame>
     </p:spTree>
     <p:extLst>
       <p:ext uri="{BB962C8B-B14F-4D97-AF65-F5344CB8AC3E}">
-        <p14:creationId xmlns:p14="http://schemas.microsoft.com/office/powerpoint/2010/main" val="2452697240"/>
+        <p14:creationId xmlns:p14="http://schemas.microsoft.com/office/powerpoint/2010/main" val="1173400529"/>
       </p:ext>
     </p:extLst>
   </p:cSld>
@@ -4388,10 +7018,140 @@
             <p:ph idx="1"/>
           </p:nvPr>
         </p:nvSpPr>
+        <p:spPr/>
+        <p:txBody>
+          <a:bodyPr>
+            <a:normAutofit/>
+          </a:bodyPr>
+          <a:lstStyle/>
+          <a:p>
+            <a:endParaRPr lang="it-IT" dirty="0"/>
+          </a:p>
+          <a:p>
+            <a:r>
+              <a:rPr lang="it-IT" dirty="0"/>
+              <a:t>Controllo di eventuali dati mancanti o trascritti in modo errato</a:t>
+            </a:r>
+          </a:p>
+          <a:p>
+            <a:r>
+              <a:rPr lang="it-IT" dirty="0"/>
+              <a:t>Nessuna normalizzazione (valori già compresi tra -1 e 1)</a:t>
+            </a:r>
+          </a:p>
+          <a:p>
+            <a:r>
+              <a:rPr lang="it-IT" dirty="0"/>
+              <a:t>Nessuna feature ritenuta non rilevante in prima analisi</a:t>
+            </a:r>
+          </a:p>
+          <a:p>
+            <a:r>
+              <a:rPr lang="it-IT" dirty="0"/>
+              <a:t>Elevata dimensionalità che preclude una rappresentazione grafica </a:t>
+            </a:r>
+            <a:r>
+              <a:rPr lang="it-IT" dirty="0">
+                <a:sym typeface="Symbol" panose="05050102010706020507" pitchFamily="18" charset="2"/>
+              </a:rPr>
+              <a:t> </a:t>
+            </a:r>
+            <a:r>
+              <a:rPr lang="it-IT" dirty="0"/>
+              <a:t>rappresentazione grafica della distribuzione di ogni feature tramite </a:t>
+            </a:r>
+            <a:r>
+              <a:rPr lang="it-IT" b="1" dirty="0"/>
+              <a:t>istogrammi impilati</a:t>
+            </a:r>
+            <a:r>
+              <a:rPr lang="it-IT" dirty="0"/>
+              <a:t>, che mostrano anche la proporzione tra le etichette</a:t>
+            </a:r>
+          </a:p>
+          <a:p>
+            <a:endParaRPr lang="it-IT" dirty="0"/>
+          </a:p>
+        </p:txBody>
+      </p:sp>
+    </p:spTree>
+    <p:extLst>
+      <p:ext uri="{BB962C8B-B14F-4D97-AF65-F5344CB8AC3E}">
+        <p14:creationId xmlns:p14="http://schemas.microsoft.com/office/powerpoint/2010/main" val="2452697240"/>
+      </p:ext>
+    </p:extLst>
+  </p:cSld>
+  <p:clrMapOvr>
+    <a:masterClrMapping/>
+  </p:clrMapOvr>
+</p:sld>
+</file>
+
+<file path=ppt/slides/slide5.xml><?xml version="1.0" encoding="utf-8"?>
+<p:sld xmlns:a="http://schemas.openxmlformats.org/drawingml/2006/main" xmlns:r="http://schemas.openxmlformats.org/officeDocument/2006/relationships" xmlns:p="http://schemas.openxmlformats.org/presentationml/2006/main">
+  <p:cSld>
+    <p:spTree>
+      <p:nvGrpSpPr>
+        <p:cNvPr id="1" name=""/>
+        <p:cNvGrpSpPr/>
+        <p:nvPr/>
+      </p:nvGrpSpPr>
+      <p:grpSpPr>
+        <a:xfrm>
+          <a:off x="0" y="0"/>
+          <a:ext cx="0" cy="0"/>
+          <a:chOff x="0" y="0"/>
+          <a:chExt cx="0" cy="0"/>
+        </a:xfrm>
+      </p:grpSpPr>
+      <p:sp>
+        <p:nvSpPr>
+          <p:cNvPr id="2" name="Titolo 1">
+            <a:extLst>
+              <a:ext uri="{FF2B5EF4-FFF2-40B4-BE49-F238E27FC236}">
+                <a16:creationId xmlns:a16="http://schemas.microsoft.com/office/drawing/2014/main" id="{1582B873-E864-43B7-B99F-EFF037CA4149}"/>
+              </a:ext>
+            </a:extLst>
+          </p:cNvPr>
+          <p:cNvSpPr>
+            <a:spLocks noGrp="1"/>
+          </p:cNvSpPr>
+          <p:nvPr>
+            <p:ph type="title"/>
+          </p:nvPr>
+        </p:nvSpPr>
+        <p:spPr/>
+        <p:txBody>
+          <a:bodyPr/>
+          <a:lstStyle/>
+          <a:p>
+            <a:r>
+              <a:rPr lang="it-IT" dirty="0"/>
+              <a:t>Analisi dei dati</a:t>
+            </a:r>
+          </a:p>
+        </p:txBody>
+      </p:sp>
+      <p:sp>
+        <p:nvSpPr>
+          <p:cNvPr id="3" name="Segnaposto contenuto 2">
+            <a:extLst>
+              <a:ext uri="{FF2B5EF4-FFF2-40B4-BE49-F238E27FC236}">
+                <a16:creationId xmlns:a16="http://schemas.microsoft.com/office/drawing/2014/main" id="{A8D9C1B6-6298-428C-A487-7A7152C86515}"/>
+              </a:ext>
+            </a:extLst>
+          </p:cNvPr>
+          <p:cNvSpPr>
+            <a:spLocks noGrp="1"/>
+          </p:cNvSpPr>
+          <p:nvPr>
+            <p:ph idx="1"/>
+          </p:nvPr>
+        </p:nvSpPr>
         <p:spPr>
           <a:xfrm>
-            <a:off x="3439887" y="322265"/>
-            <a:ext cx="8371114" cy="5682342"/>
+            <a:off x="3430650" y="658321"/>
+            <a:ext cx="8371114" cy="5563635"/>
           </a:xfrm>
         </p:spPr>
         <p:txBody>
@@ -4412,13 +7172,8 @@
             </a:r>
             <a:r>
               <a:rPr lang="it-IT" sz="1800" dirty="0"/>
-              <a:t>due feature candidate</a:t>
-            </a:r>
-          </a:p>
-          <a:p>
-            <a:pPr marL="0" indent="0">
-              <a:buNone/>
-            </a:pPr>
+              <a:t>due feature candidate ad essere rimosse</a:t>
+            </a:r>
             <a:endParaRPr lang="it-IT" dirty="0"/>
           </a:p>
           <a:p>
@@ -4451,7 +7206,7 @@
                 <a:spcPct val="100000"/>
               </a:lnSpc>
               <a:spcBef>
-                <a:spcPts val="3000"/>
+                <a:spcPts val="3600"/>
               </a:spcBef>
             </a:pPr>
             <a:r>
@@ -4466,7 +7221,7 @@
             </a:r>
             <a:r>
               <a:rPr lang="it-IT" sz="1800" dirty="0"/>
-              <a:t>una feature candidata (quella meno correlata con l’output tra le due individuate)</a:t>
+              <a:t>una feature candidata ad essere rimossa (quella meno correlata con l’output tra le due individuate)</a:t>
             </a:r>
           </a:p>
           <a:p>
@@ -4499,8 +7254,8 @@
         </p:blipFill>
         <p:spPr>
           <a:xfrm>
-            <a:off x="4348237" y="960979"/>
-            <a:ext cx="3142028" cy="2135657"/>
+            <a:off x="4348237" y="1179678"/>
+            <a:ext cx="2820273" cy="1916958"/>
           </a:xfrm>
           <a:prstGeom prst="rect">
             <a:avLst/>
@@ -4529,8 +7284,8 @@
         </p:blipFill>
         <p:spPr>
           <a:xfrm>
-            <a:off x="7871265" y="960979"/>
-            <a:ext cx="3145075" cy="2137729"/>
+            <a:off x="8019372" y="1186130"/>
+            <a:ext cx="2823321" cy="1919030"/>
           </a:xfrm>
           <a:prstGeom prst="rect">
             <a:avLst/>
@@ -4639,8 +7394,8 @@
         </p:blipFill>
         <p:spPr>
           <a:xfrm>
-            <a:off x="4373284" y="4249752"/>
-            <a:ext cx="3163548" cy="2150284"/>
+            <a:off x="4373284" y="4235960"/>
+            <a:ext cx="2795226" cy="1899933"/>
           </a:xfrm>
           <a:prstGeom prst="rect">
             <a:avLst/>
@@ -4669,8 +7424,8 @@
         </p:blipFill>
         <p:spPr>
           <a:xfrm>
-            <a:off x="7950628" y="4249752"/>
-            <a:ext cx="3163547" cy="2150284"/>
+            <a:off x="8033419" y="4235960"/>
+            <a:ext cx="2795225" cy="1899933"/>
           </a:xfrm>
           <a:prstGeom prst="rect">
             <a:avLst/>
@@ -4691,7 +7446,7 @@
         </p:nvSpPr>
         <p:spPr>
           <a:xfrm>
-            <a:off x="6839476" y="6246147"/>
+            <a:off x="6711953" y="5982004"/>
             <a:ext cx="1808508" cy="307777"/>
           </a:xfrm>
           <a:prstGeom prst="rect">
@@ -4721,151 +7476,6 @@
     <p:extLst>
       <p:ext uri="{BB962C8B-B14F-4D97-AF65-F5344CB8AC3E}">
         <p14:creationId xmlns:p14="http://schemas.microsoft.com/office/powerpoint/2010/main" val="1709543793"/>
-      </p:ext>
-    </p:extLst>
-  </p:cSld>
-  <p:clrMapOvr>
-    <a:masterClrMapping/>
-  </p:clrMapOvr>
-</p:sld>
-</file>
-
-<file path=ppt/slides/slide5.xml><?xml version="1.0" encoding="utf-8"?>
-<p:sld xmlns:a="http://schemas.openxmlformats.org/drawingml/2006/main" xmlns:r="http://schemas.openxmlformats.org/officeDocument/2006/relationships" xmlns:p="http://schemas.openxmlformats.org/presentationml/2006/main">
-  <p:cSld>
-    <p:spTree>
-      <p:nvGrpSpPr>
-        <p:cNvPr id="1" name=""/>
-        <p:cNvGrpSpPr/>
-        <p:nvPr/>
-      </p:nvGrpSpPr>
-      <p:grpSpPr>
-        <a:xfrm>
-          <a:off x="0" y="0"/>
-          <a:ext cx="0" cy="0"/>
-          <a:chOff x="0" y="0"/>
-          <a:chExt cx="0" cy="0"/>
-        </a:xfrm>
-      </p:grpSpPr>
-      <p:sp>
-        <p:nvSpPr>
-          <p:cNvPr id="2" name="Titolo 1">
-            <a:extLst>
-              <a:ext uri="{FF2B5EF4-FFF2-40B4-BE49-F238E27FC236}">
-                <a16:creationId xmlns:a16="http://schemas.microsoft.com/office/drawing/2014/main" id="{1582B873-E864-43B7-B99F-EFF037CA4149}"/>
-              </a:ext>
-            </a:extLst>
-          </p:cNvPr>
-          <p:cNvSpPr>
-            <a:spLocks noGrp="1"/>
-          </p:cNvSpPr>
-          <p:nvPr>
-            <p:ph type="title"/>
-          </p:nvPr>
-        </p:nvSpPr>
-        <p:spPr/>
-        <p:txBody>
-          <a:bodyPr/>
-          <a:lstStyle/>
-          <a:p>
-            <a:r>
-              <a:rPr lang="it-IT" dirty="0"/>
-              <a:t>Analisi dei dati</a:t>
-            </a:r>
-          </a:p>
-        </p:txBody>
-      </p:sp>
-      <p:sp>
-        <p:nvSpPr>
-          <p:cNvPr id="3" name="Segnaposto contenuto 2">
-            <a:extLst>
-              <a:ext uri="{FF2B5EF4-FFF2-40B4-BE49-F238E27FC236}">
-                <a16:creationId xmlns:a16="http://schemas.microsoft.com/office/drawing/2014/main" id="{A8D9C1B6-6298-428C-A487-7A7152C86515}"/>
-              </a:ext>
-            </a:extLst>
-          </p:cNvPr>
-          <p:cNvSpPr>
-            <a:spLocks noGrp="1"/>
-          </p:cNvSpPr>
-          <p:nvPr>
-            <p:ph idx="1"/>
-          </p:nvPr>
-        </p:nvSpPr>
-        <p:spPr/>
-        <p:txBody>
-          <a:bodyPr>
-            <a:normAutofit/>
-          </a:bodyPr>
-          <a:lstStyle/>
-          <a:p>
-            <a:endParaRPr lang="it-IT" dirty="0"/>
-          </a:p>
-          <a:p>
-            <a:r>
-              <a:rPr lang="it-IT" dirty="0"/>
-              <a:t>Risultati con 27 feature:</a:t>
-            </a:r>
-          </a:p>
-          <a:p>
-            <a:endParaRPr lang="it-IT" dirty="0"/>
-          </a:p>
-          <a:p>
-            <a:r>
-              <a:rPr lang="it-IT" dirty="0"/>
-              <a:t>Considerazioni:</a:t>
-            </a:r>
-          </a:p>
-          <a:p>
-            <a:pPr marL="0" indent="0">
-              <a:buNone/>
-            </a:pPr>
-            <a:endParaRPr lang="it-IT" dirty="0"/>
-          </a:p>
-          <a:p>
-            <a:r>
-              <a:rPr lang="it-IT" dirty="0"/>
-              <a:t>Feature </a:t>
-            </a:r>
-            <a:r>
-              <a:rPr lang="it-IT" dirty="0" err="1"/>
-              <a:t>selection</a:t>
-            </a:r>
-            <a:r>
-              <a:rPr lang="it-IT" dirty="0"/>
-              <a:t> più restrittiva: considerare solamente quelle feature che hanno una correlazione con l’output sufficiente             </a:t>
-            </a:r>
-            <a:r>
-              <a:rPr lang="it-IT" dirty="0">
-                <a:sym typeface="Symbol" panose="05050102010706020507" pitchFamily="18" charset="2"/>
-              </a:rPr>
-              <a:t></a:t>
-            </a:r>
-            <a:r>
-              <a:rPr lang="it-IT" dirty="0"/>
-              <a:t> consistente riduzione delle feature da 30 a 12</a:t>
-            </a:r>
-          </a:p>
-          <a:p>
-            <a:r>
-              <a:rPr lang="it-IT" dirty="0"/>
-              <a:t>Risultati con 12 feature:</a:t>
-            </a:r>
-          </a:p>
-          <a:p>
-            <a:endParaRPr lang="it-IT" dirty="0"/>
-          </a:p>
-          <a:p>
-            <a:r>
-              <a:rPr lang="it-IT" dirty="0"/>
-              <a:t>Considerazioni:</a:t>
-            </a:r>
-          </a:p>
-        </p:txBody>
-      </p:sp>
-    </p:spTree>
-    <p:extLst>
-      <p:ext uri="{BB962C8B-B14F-4D97-AF65-F5344CB8AC3E}">
-        <p14:creationId xmlns:p14="http://schemas.microsoft.com/office/powerpoint/2010/main" val="3576632239"/>
       </p:ext>
     </p:extLst>
   </p:cSld>
@@ -4915,15 +7525,7 @@
           <a:p>
             <a:r>
               <a:rPr lang="it-IT" dirty="0"/>
-              <a:t>Modello lineare (forse farei una </a:t>
-            </a:r>
-            <a:r>
-              <a:rPr lang="it-IT" dirty="0" err="1"/>
-              <a:t>grid</a:t>
-            </a:r>
-            <a:r>
-              <a:rPr lang="it-IT" dirty="0"/>
-              <a:t> unica a sto punto)</a:t>
+              <a:t>Analisi dei dati</a:t>
             </a:r>
           </a:p>
         </p:txBody>
@@ -4947,18 +7549,187 @@
         <p:spPr/>
         <p:txBody>
           <a:bodyPr>
-            <a:normAutofit/>
+            <a:normAutofit fontScale="70000" lnSpcReduction="20000"/>
           </a:bodyPr>
           <a:lstStyle/>
           <a:p>
             <a:endParaRPr lang="it-IT" dirty="0"/>
+          </a:p>
+          <a:p>
+            <a:r>
+              <a:rPr lang="it-IT" dirty="0"/>
+              <a:t>Risultati con 27 feature:</a:t>
+            </a:r>
+          </a:p>
+          <a:p>
+            <a:pPr marL="0" indent="0">
+              <a:buNone/>
+            </a:pPr>
+            <a:r>
+              <a:rPr lang="it-IT" b="1" dirty="0"/>
+              <a:t>{'C': 1.0, 'kernel': 'linear'} occorre 3 volte su 10 .</a:t>
+            </a:r>
+            <a:br>
+              <a:rPr lang="it-IT" b="1" dirty="0"/>
+            </a:br>
+            <a:r>
+              <a:rPr lang="it-IT" b="1" dirty="0"/>
+              <a:t>Media dei test score: 0.928832448266551 varianza: 4.400282688682181e-05</a:t>
+            </a:r>
+          </a:p>
+          <a:p>
+            <a:pPr marL="0" indent="0">
+              <a:buNone/>
+            </a:pPr>
+            <a:r>
+              <a:rPr lang="it-IT" b="1" dirty="0"/>
+              <a:t>{'C': 10.0, 'gamma': 0.1, 'kernel': '</a:t>
+            </a:r>
+            <a:r>
+              <a:rPr lang="it-IT" b="1" dirty="0" err="1"/>
+              <a:t>rbf</a:t>
+            </a:r>
+            <a:r>
+              <a:rPr lang="it-IT" b="1" dirty="0"/>
+              <a:t>'} occorre 7 volte su 10 .</a:t>
+            </a:r>
+            <a:br>
+              <a:rPr lang="it-IT" b="1" dirty="0"/>
+            </a:br>
+            <a:r>
+              <a:rPr lang="it-IT" b="1" dirty="0"/>
+              <a:t>Media dei test score: 0.9753210729277105 varianza: 3.814182675772537e-05</a:t>
+            </a:r>
+            <a:endParaRPr lang="it-IT" dirty="0"/>
+          </a:p>
+          <a:p>
+            <a:pPr marL="0" indent="0">
+              <a:buNone/>
+            </a:pPr>
+            <a:endParaRPr lang="it-IT" dirty="0"/>
+          </a:p>
+          <a:p>
+            <a:r>
+              <a:rPr lang="it-IT" dirty="0"/>
+              <a:t>Considerazioni:</a:t>
+            </a:r>
+          </a:p>
+          <a:p>
+            <a:pPr marL="0" indent="0">
+              <a:buNone/>
+            </a:pPr>
+            <a:endParaRPr lang="it-IT" dirty="0"/>
+          </a:p>
+          <a:p>
+            <a:r>
+              <a:rPr lang="it-IT" dirty="0"/>
+              <a:t>Feature </a:t>
+            </a:r>
+            <a:r>
+              <a:rPr lang="it-IT" dirty="0" err="1"/>
+              <a:t>selection</a:t>
+            </a:r>
+            <a:r>
+              <a:rPr lang="it-IT" dirty="0"/>
+              <a:t> più restrittiva: considerare solamente quelle feature che hanno una correlazione con l’output sufficiente  </a:t>
+            </a:r>
+            <a:r>
+              <a:rPr lang="it-IT" dirty="0">
+                <a:sym typeface="Symbol" panose="05050102010706020507" pitchFamily="18" charset="2"/>
+              </a:rPr>
+              <a:t></a:t>
+            </a:r>
+            <a:r>
+              <a:rPr lang="it-IT" dirty="0"/>
+              <a:t> consistente riduzione delle feature da 30 a 12</a:t>
+            </a:r>
+          </a:p>
+          <a:p>
+            <a:r>
+              <a:rPr lang="it-IT" dirty="0"/>
+              <a:t>Risultati con 12 feature:</a:t>
+            </a:r>
+          </a:p>
+          <a:p>
+            <a:pPr marL="0" indent="0">
+              <a:buNone/>
+            </a:pPr>
+            <a:r>
+              <a:rPr lang="it-IT" b="1" dirty="0"/>
+              <a:t>{'C': 1.0, 'kernel': 'linear'} occorre 3 volte su 10 .</a:t>
+            </a:r>
+            <a:br>
+              <a:rPr lang="it-IT" b="1" dirty="0"/>
+            </a:br>
+            <a:r>
+              <a:rPr lang="it-IT" b="1" dirty="0"/>
+              <a:t>Media dei test score: 0.9183242917420132 (+/- 5.086689912839577e-06)</a:t>
+            </a:r>
+            <a:br>
+              <a:rPr lang="it-IT" b="1" dirty="0"/>
+            </a:br>
+            <a:r>
+              <a:rPr lang="it-IT" b="1" dirty="0"/>
+              <a:t>Ci sono più modelli con la stessa occorrenza:</a:t>
+            </a:r>
+            <a:br>
+              <a:rPr lang="it-IT" b="1" dirty="0"/>
+            </a:br>
+            <a:r>
+              <a:rPr lang="it-IT" b="1" dirty="0"/>
+              <a:t>{'C': 100.0, 'kernel': 'linear'} occorre 3 volte su 10 .</a:t>
+            </a:r>
+            <a:br>
+              <a:rPr lang="it-IT" b="1" dirty="0"/>
+            </a:br>
+            <a:r>
+              <a:rPr lang="it-IT" b="1" dirty="0"/>
+              <a:t>Media dei test score: 0.9257918552036198 (+/- 3.821925567999536e-06)</a:t>
+            </a:r>
+            <a:endParaRPr lang="it-IT" dirty="0"/>
+          </a:p>
+          <a:p>
+            <a:pPr marL="0" indent="0">
+              <a:buNone/>
+            </a:pPr>
+            <a:r>
+              <a:rPr lang="it-IT" b="1" dirty="0"/>
+              <a:t>{'C': 100.0, 'gamma': 0.1, 'kernel': '</a:t>
+            </a:r>
+            <a:r>
+              <a:rPr lang="it-IT" b="1" dirty="0" err="1"/>
+              <a:t>rbf</a:t>
+            </a:r>
+            <a:r>
+              <a:rPr lang="it-IT" b="1" dirty="0"/>
+              <a:t>'} occorre 8 volte su 10 .</a:t>
+            </a:r>
+            <a:br>
+              <a:rPr lang="it-IT" b="1" dirty="0"/>
+            </a:br>
+            <a:r>
+              <a:rPr lang="it-IT" b="1" dirty="0"/>
+              <a:t>Media dei test score: 0.948543015063864 (+/-0.00015845729488142695)</a:t>
+            </a:r>
+          </a:p>
+          <a:p>
+            <a:pPr marL="0" indent="0">
+              <a:buNone/>
+            </a:pPr>
+            <a:endParaRPr lang="it-IT" dirty="0"/>
+          </a:p>
+          <a:p>
+            <a:r>
+              <a:rPr lang="it-IT" dirty="0"/>
+              <a:t>Considerazioni:</a:t>
+            </a:r>
           </a:p>
         </p:txBody>
       </p:sp>
     </p:spTree>
     <p:extLst>
       <p:ext uri="{BB962C8B-B14F-4D97-AF65-F5344CB8AC3E}">
-        <p14:creationId xmlns:p14="http://schemas.microsoft.com/office/powerpoint/2010/main" val="3011319870"/>
+        <p14:creationId xmlns:p14="http://schemas.microsoft.com/office/powerpoint/2010/main" val="3576632239"/>
       </p:ext>
     </p:extLst>
   </p:cSld>
@@ -4990,7 +7761,7 @@
           <p:cNvPr id="2" name="Titolo 1">
             <a:extLst>
               <a:ext uri="{FF2B5EF4-FFF2-40B4-BE49-F238E27FC236}">
-                <a16:creationId xmlns:a16="http://schemas.microsoft.com/office/drawing/2014/main" id="{76D1FB3F-80FD-4ACE-8FCB-730CE7586359}"/>
+                <a16:creationId xmlns:a16="http://schemas.microsoft.com/office/drawing/2014/main" id="{1582B873-E864-43B7-B99F-EFF037CA4149}"/>
               </a:ext>
             </a:extLst>
           </p:cNvPr>
@@ -5006,16 +7777,19 @@
           <a:bodyPr/>
           <a:lstStyle/>
           <a:p>
-            <a:endParaRPr lang="it-IT" dirty="0"/>
-          </a:p>
-        </p:txBody>
-      </p:sp>
-      <p:sp>
-        <p:nvSpPr>
-          <p:cNvPr id="3" name="Segnaposto testo 2">
+            <a:r>
+              <a:rPr lang="it-IT" dirty="0"/>
+              <a:t>Metodologia</a:t>
+            </a:r>
+          </a:p>
+        </p:txBody>
+      </p:sp>
+      <p:sp>
+        <p:nvSpPr>
+          <p:cNvPr id="3" name="Segnaposto contenuto 2">
             <a:extLst>
               <a:ext uri="{FF2B5EF4-FFF2-40B4-BE49-F238E27FC236}">
-                <a16:creationId xmlns:a16="http://schemas.microsoft.com/office/drawing/2014/main" id="{5C124C86-3F43-4B81-8F3F-2101BCB75582}"/>
+                <a16:creationId xmlns:a16="http://schemas.microsoft.com/office/drawing/2014/main" id="{A8D9C1B6-6298-428C-A487-7A7152C86515}"/>
               </a:ext>
             </a:extLst>
           </p:cNvPr>
@@ -5023,14 +7797,204 @@
             <a:spLocks noGrp="1"/>
           </p:cNvSpPr>
           <p:nvPr>
-            <p:ph type="body" idx="1"/>
+            <p:ph idx="1"/>
           </p:nvPr>
         </p:nvSpPr>
         <p:spPr/>
         <p:txBody>
-          <a:bodyPr/>
+          <a:bodyPr>
+            <a:normAutofit/>
+          </a:bodyPr>
           <a:lstStyle/>
           <a:p>
+            <a:endParaRPr lang="it-IT" dirty="0"/>
+          </a:p>
+          <a:p>
+            <a:r>
+              <a:rPr lang="it-IT" b="1" dirty="0" err="1"/>
+              <a:t>Nested</a:t>
+            </a:r>
+            <a:r>
+              <a:rPr lang="it-IT" b="1" dirty="0"/>
+              <a:t> cross </a:t>
+            </a:r>
+            <a:r>
+              <a:rPr lang="it-IT" b="1" dirty="0" err="1"/>
+              <a:t>validation</a:t>
+            </a:r>
+            <a:r>
+              <a:rPr lang="it-IT" dirty="0"/>
+              <a:t>:</a:t>
+            </a:r>
+          </a:p>
+          <a:p>
+            <a:pPr lvl="1"/>
+            <a:r>
+              <a:rPr lang="it-IT" dirty="0"/>
+              <a:t>Ciclo esterno per separare </a:t>
+            </a:r>
+            <a:r>
+              <a:rPr lang="it-IT" dirty="0" err="1"/>
+              <a:t>train+validation</a:t>
+            </a:r>
+            <a:r>
+              <a:rPr lang="it-IT" dirty="0"/>
+              <a:t> set da test set</a:t>
+            </a:r>
+          </a:p>
+          <a:p>
+            <a:pPr lvl="1"/>
+            <a:r>
+              <a:rPr lang="it-IT" dirty="0"/>
+              <a:t>Ciclo interno eseguito dalla </a:t>
+            </a:r>
+            <a:r>
+              <a:rPr lang="it-IT" b="1" dirty="0" err="1"/>
+              <a:t>GridSearchCV</a:t>
+            </a:r>
+            <a:r>
+              <a:rPr lang="it-IT" dirty="0"/>
+              <a:t> </a:t>
+            </a:r>
+          </a:p>
+          <a:p>
+            <a:pPr lvl="1">
+              <a:buFont typeface="Symbol" panose="05050102010706020507" pitchFamily="18" charset="2"/>
+              <a:buChar char="®"/>
+            </a:pPr>
+            <a:r>
+              <a:rPr lang="it-IT" dirty="0">
+                <a:sym typeface="Symbol" panose="05050102010706020507" pitchFamily="18" charset="2"/>
+              </a:rPr>
+              <a:t> </a:t>
+            </a:r>
+            <a:r>
+              <a:rPr lang="it-IT" b="1" dirty="0">
+                <a:sym typeface="Symbol" panose="05050102010706020507" pitchFamily="18" charset="2"/>
+              </a:rPr>
+              <a:t>cross </a:t>
+            </a:r>
+            <a:r>
+              <a:rPr lang="it-IT" b="1" dirty="0" err="1">
+                <a:sym typeface="Symbol" panose="05050102010706020507" pitchFamily="18" charset="2"/>
+              </a:rPr>
+              <a:t>validation</a:t>
+            </a:r>
+            <a:r>
+              <a:rPr lang="it-IT" b="1" dirty="0">
+                <a:sym typeface="Symbol" panose="05050102010706020507" pitchFamily="18" charset="2"/>
+              </a:rPr>
+              <a:t> da 10 </a:t>
+            </a:r>
+            <a:r>
+              <a:rPr lang="it-IT" b="1" dirty="0" err="1">
+                <a:sym typeface="Symbol" panose="05050102010706020507" pitchFamily="18" charset="2"/>
+              </a:rPr>
+              <a:t>fold</a:t>
+            </a:r>
+            <a:r>
+              <a:rPr lang="it-IT" b="1" dirty="0">
+                <a:sym typeface="Symbol" panose="05050102010706020507" pitchFamily="18" charset="2"/>
+              </a:rPr>
+              <a:t> </a:t>
+            </a:r>
+            <a:r>
+              <a:rPr lang="it-IT" dirty="0">
+                <a:sym typeface="Symbol" panose="05050102010706020507" pitchFamily="18" charset="2"/>
+              </a:rPr>
+              <a:t>per ciascuna combinazione di parametri</a:t>
+            </a:r>
+          </a:p>
+          <a:p>
+            <a:pPr lvl="1">
+              <a:buFont typeface="Symbol" panose="05050102010706020507" pitchFamily="18" charset="2"/>
+              <a:buChar char="®"/>
+            </a:pPr>
+            <a:r>
+              <a:rPr lang="it-IT" dirty="0">
+                <a:sym typeface="Symbol" panose="05050102010706020507" pitchFamily="18" charset="2"/>
+              </a:rPr>
+              <a:t> miglior modello sulla base dello score medio sui </a:t>
+            </a:r>
+            <a:r>
+              <a:rPr lang="it-IT" dirty="0" err="1">
+                <a:sym typeface="Symbol" panose="05050102010706020507" pitchFamily="18" charset="2"/>
+              </a:rPr>
+              <a:t>validation</a:t>
+            </a:r>
+            <a:r>
+              <a:rPr lang="it-IT" dirty="0">
+                <a:sym typeface="Symbol" panose="05050102010706020507" pitchFamily="18" charset="2"/>
+              </a:rPr>
+              <a:t> set</a:t>
+            </a:r>
+          </a:p>
+          <a:p>
+            <a:pPr lvl="1">
+              <a:buFont typeface="Symbol" panose="05050102010706020507" pitchFamily="18" charset="2"/>
+              <a:buChar char="®"/>
+            </a:pPr>
+            <a:r>
+              <a:rPr lang="it-IT" dirty="0">
+                <a:sym typeface="Symbol" panose="05050102010706020507" pitchFamily="18" charset="2"/>
+              </a:rPr>
+              <a:t> </a:t>
+            </a:r>
+            <a:r>
+              <a:rPr lang="it-IT" dirty="0" err="1">
+                <a:sym typeface="Symbol" panose="05050102010706020507" pitchFamily="18" charset="2"/>
+              </a:rPr>
+              <a:t>fit</a:t>
+            </a:r>
+            <a:r>
+              <a:rPr lang="it-IT" dirty="0">
+                <a:sym typeface="Symbol" panose="05050102010706020507" pitchFamily="18" charset="2"/>
+              </a:rPr>
+              <a:t> su tutto il </a:t>
+            </a:r>
+            <a:r>
+              <a:rPr lang="it-IT" dirty="0" err="1">
+                <a:sym typeface="Symbol" panose="05050102010706020507" pitchFamily="18" charset="2"/>
+              </a:rPr>
+              <a:t>train+validation</a:t>
+            </a:r>
+            <a:r>
+              <a:rPr lang="it-IT" dirty="0">
+                <a:sym typeface="Symbol" panose="05050102010706020507" pitchFamily="18" charset="2"/>
+              </a:rPr>
+              <a:t> set con i parametri del miglior modello</a:t>
+            </a:r>
+          </a:p>
+          <a:p>
+            <a:pPr marL="502920" lvl="1" indent="0">
+              <a:buNone/>
+            </a:pPr>
+            <a:r>
+              <a:rPr lang="it-IT" dirty="0">
+                <a:sym typeface="Symbol" panose="05050102010706020507" pitchFamily="18" charset="2"/>
+              </a:rPr>
+              <a:t>	e score sul test set lasciato da parte all’inizio del ciclo</a:t>
+            </a:r>
+            <a:endParaRPr lang="it-IT" dirty="0"/>
+          </a:p>
+          <a:p>
+            <a:pPr lvl="1"/>
+            <a:r>
+              <a:rPr lang="it-IT" dirty="0"/>
+              <a:t>10 iterazioni </a:t>
+            </a:r>
+          </a:p>
+          <a:p>
+            <a:r>
+              <a:rPr lang="it-IT" dirty="0"/>
+              <a:t>Modello più frequente </a:t>
+            </a:r>
+            <a:r>
+              <a:rPr lang="it-IT" dirty="0">
+                <a:sym typeface="Symbol" panose="05050102010706020507" pitchFamily="18" charset="2"/>
+              </a:rPr>
+              <a:t> media degli score raggiunti </a:t>
+            </a:r>
             <a:endParaRPr lang="it-IT" dirty="0"/>
           </a:p>
         </p:txBody>
@@ -5038,7 +8002,658 @@
     </p:spTree>
     <p:extLst>
       <p:ext uri="{BB962C8B-B14F-4D97-AF65-F5344CB8AC3E}">
-        <p14:creationId xmlns:p14="http://schemas.microsoft.com/office/powerpoint/2010/main" val="2802610556"/>
+        <p14:creationId xmlns:p14="http://schemas.microsoft.com/office/powerpoint/2010/main" val="2558790269"/>
+      </p:ext>
+    </p:extLst>
+  </p:cSld>
+  <p:clrMapOvr>
+    <a:masterClrMapping/>
+  </p:clrMapOvr>
+</p:sld>
+</file>
+
+<file path=ppt/slides/slide8.xml><?xml version="1.0" encoding="utf-8"?>
+<p:sld xmlns:a="http://schemas.openxmlformats.org/drawingml/2006/main" xmlns:r="http://schemas.openxmlformats.org/officeDocument/2006/relationships" xmlns:p="http://schemas.openxmlformats.org/presentationml/2006/main">
+  <p:cSld>
+    <p:spTree>
+      <p:nvGrpSpPr>
+        <p:cNvPr id="1" name=""/>
+        <p:cNvGrpSpPr/>
+        <p:nvPr/>
+      </p:nvGrpSpPr>
+      <p:grpSpPr>
+        <a:xfrm>
+          <a:off x="0" y="0"/>
+          <a:ext cx="0" cy="0"/>
+          <a:chOff x="0" y="0"/>
+          <a:chExt cx="0" cy="0"/>
+        </a:xfrm>
+      </p:grpSpPr>
+      <p:sp>
+        <p:nvSpPr>
+          <p:cNvPr id="2" name="Titolo 1">
+            <a:extLst>
+              <a:ext uri="{FF2B5EF4-FFF2-40B4-BE49-F238E27FC236}">
+                <a16:creationId xmlns:a16="http://schemas.microsoft.com/office/drawing/2014/main" id="{1582B873-E864-43B7-B99F-EFF037CA4149}"/>
+              </a:ext>
+            </a:extLst>
+          </p:cNvPr>
+          <p:cNvSpPr>
+            <a:spLocks noGrp="1"/>
+          </p:cNvSpPr>
+          <p:nvPr>
+            <p:ph type="title"/>
+          </p:nvPr>
+        </p:nvSpPr>
+        <p:spPr/>
+        <p:txBody>
+          <a:bodyPr/>
+          <a:lstStyle/>
+          <a:p>
+            <a:r>
+              <a:rPr lang="it-IT" dirty="0"/>
+              <a:t>Modello lineare</a:t>
+            </a:r>
+          </a:p>
+        </p:txBody>
+      </p:sp>
+      <p:sp>
+        <p:nvSpPr>
+          <p:cNvPr id="3" name="Segnaposto contenuto 2">
+            <a:extLst>
+              <a:ext uri="{FF2B5EF4-FFF2-40B4-BE49-F238E27FC236}">
+                <a16:creationId xmlns:a16="http://schemas.microsoft.com/office/drawing/2014/main" id="{A8D9C1B6-6298-428C-A487-7A7152C86515}"/>
+              </a:ext>
+            </a:extLst>
+          </p:cNvPr>
+          <p:cNvSpPr>
+            <a:spLocks noGrp="1"/>
+          </p:cNvSpPr>
+          <p:nvPr>
+            <p:ph idx="1"/>
+          </p:nvPr>
+        </p:nvSpPr>
+        <p:spPr>
+          <a:xfrm>
+            <a:off x="3895748" y="864108"/>
+            <a:ext cx="7315200" cy="5120640"/>
+          </a:xfrm>
+        </p:spPr>
+        <p:txBody>
+          <a:bodyPr>
+            <a:normAutofit/>
+          </a:bodyPr>
+          <a:lstStyle/>
+          <a:p>
+            <a:r>
+              <a:rPr lang="it-IT" dirty="0"/>
+              <a:t>C=1 si ripete solo 4 volte su 10 </a:t>
+            </a:r>
+            <a:r>
+              <a:rPr lang="it-IT" dirty="0">
+                <a:sym typeface="Symbol" panose="05050102010706020507" pitchFamily="18" charset="2"/>
+              </a:rPr>
+              <a:t></a:t>
+            </a:r>
+            <a:r>
+              <a:rPr lang="it-IT" dirty="0"/>
+              <a:t> miglior modello con media degli score </a:t>
+            </a:r>
+            <a:r>
+              <a:rPr lang="it-IT" b="1" dirty="0"/>
+              <a:t>0.9267131974503531 (+/- 0.00010445088951476313)</a:t>
+            </a:r>
+            <a:endParaRPr lang="it-IT" dirty="0"/>
+          </a:p>
+          <a:p>
+            <a:r>
+              <a:rPr lang="it-IT" dirty="0"/>
+              <a:t>In realtà ci sarebbe anche C=1000 che si ripete 3 volte e avrebbe una media di 0.9273435177381565 (+/- 7.880108821144349e-06)</a:t>
+            </a:r>
+          </a:p>
+          <a:p>
+            <a:pPr marL="0" indent="0">
+              <a:buNone/>
+            </a:pPr>
+            <a:endParaRPr lang="it-IT" dirty="0"/>
+          </a:p>
+          <a:p>
+            <a:pPr marL="0" indent="0">
+              <a:buNone/>
+            </a:pPr>
+            <a:endParaRPr lang="it-IT" dirty="0"/>
+          </a:p>
+          <a:p>
+            <a:endParaRPr lang="it-IT" dirty="0"/>
+          </a:p>
+          <a:p>
+            <a:endParaRPr lang="it-IT" dirty="0"/>
+          </a:p>
+          <a:p>
+            <a:endParaRPr lang="it-IT" dirty="0"/>
+          </a:p>
+          <a:p>
+            <a:endParaRPr lang="it-IT" dirty="0"/>
+          </a:p>
+          <a:p>
+            <a:endParaRPr lang="it-IT" dirty="0"/>
+          </a:p>
+        </p:txBody>
+      </p:sp>
+      <p:graphicFrame>
+        <p:nvGraphicFramePr>
+          <p:cNvPr id="4" name="Tabella 3">
+            <a:extLst>
+              <a:ext uri="{FF2B5EF4-FFF2-40B4-BE49-F238E27FC236}">
+                <a16:creationId xmlns:a16="http://schemas.microsoft.com/office/drawing/2014/main" id="{ADA2CBC0-25B0-4911-98E4-59A3BF4559FA}"/>
+              </a:ext>
+            </a:extLst>
+          </p:cNvPr>
+          <p:cNvGraphicFramePr>
+            <a:graphicFrameLocks noGrp="1"/>
+          </p:cNvGraphicFramePr>
+          <p:nvPr>
+            <p:extLst>
+              <p:ext uri="{D42A27DB-BD31-4B8C-83A1-F6EECF244321}">
+                <p14:modId xmlns:p14="http://schemas.microsoft.com/office/powerpoint/2010/main" val="2015589929"/>
+              </p:ext>
+            </p:extLst>
+          </p:nvPr>
+        </p:nvGraphicFramePr>
+        <p:xfrm>
+          <a:off x="3895749" y="2746446"/>
+          <a:ext cx="7315200" cy="2758440"/>
+        </p:xfrm>
+        <a:graphic>
+          <a:graphicData uri="http://schemas.openxmlformats.org/drawingml/2006/table">
+            <a:tbl>
+              <a:tblPr firstRow="1" bandRow="1">
+                <a:tableStyleId>{5C22544A-7EE6-4342-B048-85BDC9FD1C3A}</a:tableStyleId>
+              </a:tblPr>
+              <a:tblGrid>
+                <a:gridCol w="1324651">
+                  <a:extLst>
+                    <a:ext uri="{9D8B030D-6E8A-4147-A177-3AD203B41FA5}">
+                      <a16:colId xmlns:a16="http://schemas.microsoft.com/office/drawing/2014/main" val="2015538800"/>
+                    </a:ext>
+                  </a:extLst>
+                </a:gridCol>
+                <a:gridCol w="1400280">
+                  <a:extLst>
+                    <a:ext uri="{9D8B030D-6E8A-4147-A177-3AD203B41FA5}">
+                      <a16:colId xmlns:a16="http://schemas.microsoft.com/office/drawing/2014/main" val="348667406"/>
+                    </a:ext>
+                  </a:extLst>
+                </a:gridCol>
+                <a:gridCol w="4590269">
+                  <a:extLst>
+                    <a:ext uri="{9D8B030D-6E8A-4147-A177-3AD203B41FA5}">
+                      <a16:colId xmlns:a16="http://schemas.microsoft.com/office/drawing/2014/main" val="632916334"/>
+                    </a:ext>
+                  </a:extLst>
+                </a:gridCol>
+              </a:tblGrid>
+              <a:tr h="0">
+                <a:tc>
+                  <a:txBody>
+                    <a:bodyPr/>
+                    <a:lstStyle/>
+                    <a:p>
+                      <a:r>
+                        <a:rPr lang="it-IT" dirty="0"/>
+                        <a:t>Parametro</a:t>
+                      </a:r>
+                    </a:p>
+                  </a:txBody>
+                  <a:tcPr/>
+                </a:tc>
+                <a:tc>
+                  <a:txBody>
+                    <a:bodyPr/>
+                    <a:lstStyle/>
+                    <a:p>
+                      <a:pPr algn="ctr"/>
+                      <a:r>
+                        <a:rPr lang="it-IT" dirty="0"/>
+                        <a:t>Occorrenze</a:t>
+                      </a:r>
+                    </a:p>
+                  </a:txBody>
+                  <a:tcPr/>
+                </a:tc>
+                <a:tc>
+                  <a:txBody>
+                    <a:bodyPr/>
+                    <a:lstStyle/>
+                    <a:p>
+                      <a:r>
+                        <a:rPr lang="it-IT" dirty="0" err="1"/>
+                        <a:t>Accuracy</a:t>
+                      </a:r>
+                      <a:r>
+                        <a:rPr lang="it-IT" dirty="0"/>
+                        <a:t> sul test set</a:t>
+                      </a:r>
+                    </a:p>
+                  </a:txBody>
+                  <a:tcPr/>
+                </a:tc>
+                <a:extLst>
+                  <a:ext uri="{0D108BD9-81ED-4DB2-BD59-A6C34878D82A}">
+                    <a16:rowId xmlns:a16="http://schemas.microsoft.com/office/drawing/2014/main" val="3666292966"/>
+                  </a:ext>
+                </a:extLst>
+              </a:tr>
+              <a:tr h="370840">
+                <a:tc>
+                  <a:txBody>
+                    <a:bodyPr/>
+                    <a:lstStyle/>
+                    <a:p>
+                      <a:r>
+                        <a:rPr lang="it-IT" dirty="0"/>
+                        <a:t>C=1</a:t>
+                      </a:r>
+                    </a:p>
+                  </a:txBody>
+                  <a:tcPr/>
+                </a:tc>
+                <a:tc>
+                  <a:txBody>
+                    <a:bodyPr/>
+                    <a:lstStyle/>
+                    <a:p>
+                      <a:pPr algn="ctr"/>
+                      <a:r>
+                        <a:rPr lang="it-IT" dirty="0"/>
+                        <a:t>4</a:t>
+                      </a:r>
+                    </a:p>
+                  </a:txBody>
+                  <a:tcPr/>
+                </a:tc>
+                <a:tc>
+                  <a:txBody>
+                    <a:bodyPr/>
+                    <a:lstStyle/>
+                    <a:p>
+                      <a:r>
+                        <a:rPr lang="it-IT" dirty="0"/>
+                        <a:t>[0.9276672694394213, 0.9384615384615385, 0.9104072398190045, 0.930316742081448]</a:t>
+                      </a:r>
+                    </a:p>
+                  </a:txBody>
+                  <a:tcPr/>
+                </a:tc>
+                <a:extLst>
+                  <a:ext uri="{0D108BD9-81ED-4DB2-BD59-A6C34878D82A}">
+                    <a16:rowId xmlns:a16="http://schemas.microsoft.com/office/drawing/2014/main" val="4201979726"/>
+                  </a:ext>
+                </a:extLst>
+              </a:tr>
+              <a:tr h="370840">
+                <a:tc>
+                  <a:txBody>
+                    <a:bodyPr/>
+                    <a:lstStyle/>
+                    <a:p>
+                      <a:r>
+                        <a:rPr lang="it-IT" dirty="0"/>
+                        <a:t>C=1000</a:t>
+                      </a:r>
+                    </a:p>
+                  </a:txBody>
+                  <a:tcPr/>
+                </a:tc>
+                <a:tc>
+                  <a:txBody>
+                    <a:bodyPr/>
+                    <a:lstStyle/>
+                    <a:p>
+                      <a:pPr algn="ctr"/>
+                      <a:r>
+                        <a:rPr lang="it-IT" dirty="0"/>
+                        <a:t>3</a:t>
+                      </a:r>
+                    </a:p>
+                  </a:txBody>
+                  <a:tcPr/>
+                </a:tc>
+                <a:tc>
+                  <a:txBody>
+                    <a:bodyPr/>
+                    <a:lstStyle/>
+                    <a:p>
+                      <a:r>
+                        <a:rPr lang="it-IT" dirty="0"/>
+                        <a:t>[0.9249547920433996, 0.9312839059674503, 0.92579185520362]</a:t>
+                      </a:r>
+                    </a:p>
+                  </a:txBody>
+                  <a:tcPr/>
+                </a:tc>
+                <a:extLst>
+                  <a:ext uri="{0D108BD9-81ED-4DB2-BD59-A6C34878D82A}">
+                    <a16:rowId xmlns:a16="http://schemas.microsoft.com/office/drawing/2014/main" val="3142421780"/>
+                  </a:ext>
+                </a:extLst>
+              </a:tr>
+              <a:tr h="370840">
+                <a:tc>
+                  <a:txBody>
+                    <a:bodyPr/>
+                    <a:lstStyle/>
+                    <a:p>
+                      <a:r>
+                        <a:rPr lang="it-IT" dirty="0"/>
+                        <a:t>C=100</a:t>
+                      </a:r>
+                    </a:p>
+                  </a:txBody>
+                  <a:tcPr/>
+                </a:tc>
+                <a:tc>
+                  <a:txBody>
+                    <a:bodyPr/>
+                    <a:lstStyle/>
+                    <a:p>
+                      <a:pPr algn="ctr"/>
+                      <a:r>
+                        <a:rPr lang="it-IT" dirty="0"/>
+                        <a:t>1</a:t>
+                      </a:r>
+                    </a:p>
+                  </a:txBody>
+                  <a:tcPr/>
+                </a:tc>
+                <a:tc>
+                  <a:txBody>
+                    <a:bodyPr/>
+                    <a:lstStyle/>
+                    <a:p>
+                      <a:r>
+                        <a:rPr lang="it-IT" dirty="0"/>
+                        <a:t>[0.9276672694394213]</a:t>
+                      </a:r>
+                    </a:p>
+                  </a:txBody>
+                  <a:tcPr/>
+                </a:tc>
+                <a:extLst>
+                  <a:ext uri="{0D108BD9-81ED-4DB2-BD59-A6C34878D82A}">
+                    <a16:rowId xmlns:a16="http://schemas.microsoft.com/office/drawing/2014/main" val="3152955369"/>
+                  </a:ext>
+                </a:extLst>
+              </a:tr>
+              <a:tr h="370840">
+                <a:tc>
+                  <a:txBody>
+                    <a:bodyPr/>
+                    <a:lstStyle/>
+                    <a:p>
+                      <a:r>
+                        <a:rPr lang="it-IT" dirty="0"/>
+                        <a:t>C=10</a:t>
+                      </a:r>
+                    </a:p>
+                  </a:txBody>
+                  <a:tcPr/>
+                </a:tc>
+                <a:tc>
+                  <a:txBody>
+                    <a:bodyPr/>
+                    <a:lstStyle/>
+                    <a:p>
+                      <a:pPr algn="ctr"/>
+                      <a:r>
+                        <a:rPr lang="it-IT" dirty="0"/>
+                        <a:t>1</a:t>
+                      </a:r>
+                    </a:p>
+                  </a:txBody>
+                  <a:tcPr/>
+                </a:tc>
+                <a:tc>
+                  <a:txBody>
+                    <a:bodyPr/>
+                    <a:lstStyle/>
+                    <a:p>
+                      <a:r>
+                        <a:rPr lang="it-IT" dirty="0"/>
+                        <a:t>[0.9258589511754068]</a:t>
+                      </a:r>
+                    </a:p>
+                  </a:txBody>
+                  <a:tcPr/>
+                </a:tc>
+                <a:extLst>
+                  <a:ext uri="{0D108BD9-81ED-4DB2-BD59-A6C34878D82A}">
+                    <a16:rowId xmlns:a16="http://schemas.microsoft.com/office/drawing/2014/main" val="529368032"/>
+                  </a:ext>
+                </a:extLst>
+              </a:tr>
+              <a:tr h="370840">
+                <a:tc>
+                  <a:txBody>
+                    <a:bodyPr/>
+                    <a:lstStyle/>
+                    <a:p>
+                      <a:r>
+                        <a:rPr lang="it-IT" dirty="0"/>
+                        <a:t>C=0.1</a:t>
+                      </a:r>
+                    </a:p>
+                  </a:txBody>
+                  <a:tcPr/>
+                </a:tc>
+                <a:tc>
+                  <a:txBody>
+                    <a:bodyPr/>
+                    <a:lstStyle/>
+                    <a:p>
+                      <a:pPr algn="ctr"/>
+                      <a:r>
+                        <a:rPr lang="it-IT" dirty="0"/>
+                        <a:t>1</a:t>
+                      </a:r>
+                    </a:p>
+                  </a:txBody>
+                  <a:tcPr/>
+                </a:tc>
+                <a:tc>
+                  <a:txBody>
+                    <a:bodyPr/>
+                    <a:lstStyle/>
+                    <a:p>
+                      <a:r>
+                        <a:rPr lang="it-IT" dirty="0"/>
+                        <a:t>[0.9276018099547512]</a:t>
+                      </a:r>
+                    </a:p>
+                  </a:txBody>
+                  <a:tcPr/>
+                </a:tc>
+                <a:extLst>
+                  <a:ext uri="{0D108BD9-81ED-4DB2-BD59-A6C34878D82A}">
+                    <a16:rowId xmlns:a16="http://schemas.microsoft.com/office/drawing/2014/main" val="97160573"/>
+                  </a:ext>
+                </a:extLst>
+              </a:tr>
+            </a:tbl>
+          </a:graphicData>
+        </a:graphic>
+      </p:graphicFrame>
+    </p:spTree>
+    <p:extLst>
+      <p:ext uri="{BB962C8B-B14F-4D97-AF65-F5344CB8AC3E}">
+        <p14:creationId xmlns:p14="http://schemas.microsoft.com/office/powerpoint/2010/main" val="3011319870"/>
+      </p:ext>
+    </p:extLst>
+  </p:cSld>
+  <p:clrMapOvr>
+    <a:masterClrMapping/>
+  </p:clrMapOvr>
+</p:sld>
+</file>
+
+<file path=ppt/slides/slide9.xml><?xml version="1.0" encoding="utf-8"?>
+<p:sld xmlns:a="http://schemas.openxmlformats.org/drawingml/2006/main" xmlns:r="http://schemas.openxmlformats.org/officeDocument/2006/relationships" xmlns:p="http://schemas.openxmlformats.org/presentationml/2006/main">
+  <p:cSld>
+    <p:spTree>
+      <p:nvGrpSpPr>
+        <p:cNvPr id="1" name=""/>
+        <p:cNvGrpSpPr/>
+        <p:nvPr/>
+      </p:nvGrpSpPr>
+      <p:grpSpPr>
+        <a:xfrm>
+          <a:off x="0" y="0"/>
+          <a:ext cx="0" cy="0"/>
+          <a:chOff x="0" y="0"/>
+          <a:chExt cx="0" cy="0"/>
+        </a:xfrm>
+      </p:grpSpPr>
+      <p:sp>
+        <p:nvSpPr>
+          <p:cNvPr id="2" name="Titolo 1">
+            <a:extLst>
+              <a:ext uri="{FF2B5EF4-FFF2-40B4-BE49-F238E27FC236}">
+                <a16:creationId xmlns:a16="http://schemas.microsoft.com/office/drawing/2014/main" id="{1582B873-E864-43B7-B99F-EFF037CA4149}"/>
+              </a:ext>
+            </a:extLst>
+          </p:cNvPr>
+          <p:cNvSpPr>
+            <a:spLocks noGrp="1"/>
+          </p:cNvSpPr>
+          <p:nvPr>
+            <p:ph type="title"/>
+          </p:nvPr>
+        </p:nvSpPr>
+        <p:spPr/>
+        <p:txBody>
+          <a:bodyPr/>
+          <a:lstStyle/>
+          <a:p>
+            <a:r>
+              <a:rPr lang="it-IT" dirty="0"/>
+              <a:t>Modello lineare</a:t>
+            </a:r>
+          </a:p>
+        </p:txBody>
+      </p:sp>
+      <p:sp>
+        <p:nvSpPr>
+          <p:cNvPr id="3" name="Segnaposto contenuto 2">
+            <a:extLst>
+              <a:ext uri="{FF2B5EF4-FFF2-40B4-BE49-F238E27FC236}">
+                <a16:creationId xmlns:a16="http://schemas.microsoft.com/office/drawing/2014/main" id="{A8D9C1B6-6298-428C-A487-7A7152C86515}"/>
+              </a:ext>
+            </a:extLst>
+          </p:cNvPr>
+          <p:cNvSpPr>
+            <a:spLocks noGrp="1"/>
+          </p:cNvSpPr>
+          <p:nvPr>
+            <p:ph idx="1"/>
+          </p:nvPr>
+        </p:nvSpPr>
+        <p:spPr>
+          <a:xfrm>
+            <a:off x="4014281" y="864108"/>
+            <a:ext cx="7315200" cy="5120640"/>
+          </a:xfrm>
+        </p:spPr>
+        <p:txBody>
+          <a:bodyPr>
+            <a:normAutofit/>
+          </a:bodyPr>
+          <a:lstStyle/>
+          <a:p>
+            <a:r>
+              <a:rPr lang="it-IT" dirty="0"/>
+              <a:t>Commentare il grafico</a:t>
+            </a:r>
+          </a:p>
+          <a:p>
+            <a:pPr marL="0" indent="0">
+              <a:buNone/>
+            </a:pPr>
+            <a:endParaRPr lang="it-IT" dirty="0"/>
+          </a:p>
+          <a:p>
+            <a:pPr marL="0" indent="0">
+              <a:buNone/>
+            </a:pPr>
+            <a:endParaRPr lang="it-IT" dirty="0"/>
+          </a:p>
+          <a:p>
+            <a:endParaRPr lang="it-IT" dirty="0"/>
+          </a:p>
+          <a:p>
+            <a:endParaRPr lang="it-IT" dirty="0"/>
+          </a:p>
+          <a:p>
+            <a:endParaRPr lang="it-IT" dirty="0"/>
+          </a:p>
+          <a:p>
+            <a:endParaRPr lang="it-IT" dirty="0"/>
+          </a:p>
+          <a:p>
+            <a:endParaRPr lang="it-IT" dirty="0"/>
+          </a:p>
+        </p:txBody>
+      </p:sp>
+      <p:pic>
+        <p:nvPicPr>
+          <p:cNvPr id="1027" name="Picture 3" descr="https://lh3.googleusercontent.com/OMwH7tmjh81CqEVjPv7D2elK4iT3J2U4x_PXsD6hyc7wtSMu5Fuyj4fPRu0v_TXZFRkThNulBO1gaoSRZRCwxoHfejOCX7MlQbXzHi0JaIQxHUOVAiih92KXr-zGaXiVEbjf8rE7">
+            <a:extLst>
+              <a:ext uri="{FF2B5EF4-FFF2-40B4-BE49-F238E27FC236}">
+                <a16:creationId xmlns:a16="http://schemas.microsoft.com/office/drawing/2014/main" id="{C6FD5C85-C8DF-463C-ACAF-F4DEA99D17AE}"/>
+              </a:ext>
+            </a:extLst>
+          </p:cNvPr>
+          <p:cNvPicPr>
+            <a:picLocks noChangeAspect="1" noChangeArrowheads="1"/>
+          </p:cNvPicPr>
+          <p:nvPr/>
+        </p:nvPicPr>
+        <p:blipFill>
+          <a:blip r:embed="rId2">
+            <a:extLst>
+              <a:ext uri="{28A0092B-C50C-407E-A947-70E740481C1C}">
+                <a14:useLocalDpi xmlns:a14="http://schemas.microsoft.com/office/drawing/2010/main" val="0"/>
+              </a:ext>
+            </a:extLst>
+          </a:blip>
+          <a:srcRect/>
+          <a:stretch>
+            <a:fillRect/>
+          </a:stretch>
+        </p:blipFill>
+        <p:spPr bwMode="auto">
+          <a:xfrm>
+            <a:off x="7500431" y="3561165"/>
+            <a:ext cx="3829050" cy="2686050"/>
+          </a:xfrm>
+          <a:prstGeom prst="rect">
+            <a:avLst/>
+          </a:prstGeom>
+          <a:noFill/>
+          <a:extLst>
+            <a:ext uri="{909E8E84-426E-40DD-AFC4-6F175D3DCCD1}">
+              <a14:hiddenFill xmlns:a14="http://schemas.microsoft.com/office/drawing/2010/main">
+                <a:solidFill>
+                  <a:srgbClr val="FFFFFF"/>
+                </a:solidFill>
+              </a14:hiddenFill>
+            </a:ext>
+          </a:extLst>
+        </p:spPr>
+      </p:pic>
+    </p:spTree>
+    <p:extLst>
+      <p:ext uri="{BB962C8B-B14F-4D97-AF65-F5344CB8AC3E}">
+        <p14:creationId xmlns:p14="http://schemas.microsoft.com/office/powerpoint/2010/main" val="2937132577"/>
       </p:ext>
     </p:extLst>
   </p:cSld>

</xml_diff>